<commit_message>
Update slides Add REST Http file with requests for Azure-Api-Management Add Swagger generated documentation
</commit_message>
<xml_diff>
--- a/API Management.pptx
+++ b/API Management.pptx
@@ -5,14 +5,19 @@
     <p:sldMasterId id="2147483648" r:id="rId1"/>
   </p:sldMasterIdLst>
   <p:notesMasterIdLst>
-    <p:notesMasterId r:id="rId7"/>
+    <p:notesMasterId r:id="rId12"/>
   </p:notesMasterIdLst>
   <p:sldIdLst>
     <p:sldId id="256" r:id="rId2"/>
     <p:sldId id="310" r:id="rId3"/>
-    <p:sldId id="312" r:id="rId4"/>
-    <p:sldId id="313" r:id="rId5"/>
-    <p:sldId id="311" r:id="rId6"/>
+    <p:sldId id="316" r:id="rId4"/>
+    <p:sldId id="315" r:id="rId5"/>
+    <p:sldId id="313" r:id="rId6"/>
+    <p:sldId id="319" r:id="rId7"/>
+    <p:sldId id="314" r:id="rId8"/>
+    <p:sldId id="311" r:id="rId9"/>
+    <p:sldId id="317" r:id="rId10"/>
+    <p:sldId id="318" r:id="rId11"/>
   </p:sldIdLst>
   <p:sldSz cx="12192000" cy="6858000"/>
   <p:notesSz cx="6858000" cy="9144000"/>
@@ -119,6 +124,633 @@
 </p:presentation>
 </file>
 
+<file path=ppt/revisionInfo.xml><?xml version="1.0" encoding="utf-8"?>
+<p1510:revInfo xmlns:a="http://schemas.openxmlformats.org/drawingml/2006/main" xmlns:r="http://schemas.openxmlformats.org/officeDocument/2006/relationships" xmlns:p1510="http://schemas.microsoft.com/office/powerpoint/2015/10/main">
+  <p1510:revLst>
+    <p1510:client id="{2FEB6357-6CA3-BFCA-AD14-18DDEC69A950}" v="1" dt="2019-06-19T04:30:30.321"/>
+    <p1510:client id="{74644EFD-C0FD-44ED-962D-5CF4571A1EC9}" v="131" dt="2019-06-19T06:27:13.204"/>
+    <p1510:client id="{87D884D8-F19F-4267-BC00-AA9F81D2836D}" v="667" dt="2019-06-18T22:42:51.624"/>
+  </p1510:revLst>
+</p1510:revInfo>
+</file>
+
+<file path=ppt/changesInfos/changesInfo1.xml><?xml version="1.0" encoding="utf-8"?>
+<pc:chgInfo xmlns:a="http://schemas.openxmlformats.org/drawingml/2006/main" xmlns:r="http://schemas.openxmlformats.org/officeDocument/2006/relationships" xmlns:ac="http://schemas.microsoft.com/office/drawing/2013/main/command" xmlns:pc="http://schemas.microsoft.com/office/powerpoint/2013/main/command">
+  <pc:docChgLst>
+    <pc:chgData name="Guest User" userId="S::urn:spo:anon#7745ecf66a1addff6472ab9ec02ce6695f8123e3cb45a3fe4b672b062b5a9943::" providerId="AD" clId="Web-{87D884D8-F19F-4267-BC00-AA9F81D2836D}"/>
+    <pc:docChg chg="addSld modSld sldOrd">
+      <pc:chgData name="Guest User" userId="S::urn:spo:anon#7745ecf66a1addff6472ab9ec02ce6695f8123e3cb45a3fe4b672b062b5a9943::" providerId="AD" clId="Web-{87D884D8-F19F-4267-BC00-AA9F81D2836D}" dt="2019-06-18T22:42:54.562" v="1152" actId="20577"/>
+      <pc:docMkLst>
+        <pc:docMk/>
+      </pc:docMkLst>
+      <pc:sldChg chg="addSp modSp">
+        <pc:chgData name="Guest User" userId="S::urn:spo:anon#7745ecf66a1addff6472ab9ec02ce6695f8123e3cb45a3fe4b672b062b5a9943::" providerId="AD" clId="Web-{87D884D8-F19F-4267-BC00-AA9F81D2836D}" dt="2019-06-18T18:51:46.467" v="404" actId="14100"/>
+        <pc:sldMkLst>
+          <pc:docMk/>
+          <pc:sldMk cId="2436657735" sldId="311"/>
+        </pc:sldMkLst>
+        <pc:spChg chg="add mod">
+          <ac:chgData name="Guest User" userId="S::urn:spo:anon#7745ecf66a1addff6472ab9ec02ce6695f8123e3cb45a3fe4b672b062b5a9943::" providerId="AD" clId="Web-{87D884D8-F19F-4267-BC00-AA9F81D2836D}" dt="2019-06-18T18:51:46.467" v="404" actId="14100"/>
+          <ac:spMkLst>
+            <pc:docMk/>
+            <pc:sldMk cId="2436657735" sldId="311"/>
+            <ac:spMk id="5" creationId="{E5B32264-97E7-4692-BAC5-1174387C3639}"/>
+          </ac:spMkLst>
+        </pc:spChg>
+      </pc:sldChg>
+      <pc:sldChg chg="addSp modSp new ord">
+        <pc:chgData name="Guest User" userId="S::urn:spo:anon#7745ecf66a1addff6472ab9ec02ce6695f8123e3cb45a3fe4b672b062b5a9943::" providerId="AD" clId="Web-{87D884D8-F19F-4267-BC00-AA9F81D2836D}" dt="2019-06-18T17:02:06.346" v="68"/>
+        <pc:sldMkLst>
+          <pc:docMk/>
+          <pc:sldMk cId="594093502" sldId="314"/>
+        </pc:sldMkLst>
+        <pc:spChg chg="mod">
+          <ac:chgData name="Guest User" userId="S::urn:spo:anon#7745ecf66a1addff6472ab9ec02ce6695f8123e3cb45a3fe4b672b062b5a9943::" providerId="AD" clId="Web-{87D884D8-F19F-4267-BC00-AA9F81D2836D}" dt="2019-06-18T16:58:13.314" v="39" actId="20577"/>
+          <ac:spMkLst>
+            <pc:docMk/>
+            <pc:sldMk cId="594093502" sldId="314"/>
+            <ac:spMk id="2" creationId="{C88BBCE8-14AD-43BC-90E4-79FDE23DDB1C}"/>
+          </ac:spMkLst>
+        </pc:spChg>
+        <pc:spChg chg="add mod">
+          <ac:chgData name="Guest User" userId="S::urn:spo:anon#7745ecf66a1addff6472ab9ec02ce6695f8123e3cb45a3fe4b672b062b5a9943::" providerId="AD" clId="Web-{87D884D8-F19F-4267-BC00-AA9F81D2836D}" dt="2019-06-18T17:01:18.815" v="65" actId="14100"/>
+          <ac:spMkLst>
+            <pc:docMk/>
+            <pc:sldMk cId="594093502" sldId="314"/>
+            <ac:spMk id="5" creationId="{C655C279-8914-4DEC-B333-394607FA394D}"/>
+          </ac:spMkLst>
+        </pc:spChg>
+        <pc:picChg chg="add mod">
+          <ac:chgData name="Guest User" userId="S::urn:spo:anon#7745ecf66a1addff6472ab9ec02ce6695f8123e3cb45a3fe4b672b062b5a9943::" providerId="AD" clId="Web-{87D884D8-F19F-4267-BC00-AA9F81D2836D}" dt="2019-06-18T17:01:54.361" v="67" actId="1076"/>
+          <ac:picMkLst>
+            <pc:docMk/>
+            <pc:sldMk cId="594093502" sldId="314"/>
+            <ac:picMk id="3" creationId="{319B1B18-3758-4A88-B868-3168B65C5646}"/>
+          </ac:picMkLst>
+        </pc:picChg>
+      </pc:sldChg>
+      <pc:sldChg chg="addSp modSp new ord">
+        <pc:chgData name="Guest User" userId="S::urn:spo:anon#7745ecf66a1addff6472ab9ec02ce6695f8123e3cb45a3fe4b672b062b5a9943::" providerId="AD" clId="Web-{87D884D8-F19F-4267-BC00-AA9F81D2836D}" dt="2019-06-18T17:24:25.673" v="223" actId="20577"/>
+        <pc:sldMkLst>
+          <pc:docMk/>
+          <pc:sldMk cId="1704287799" sldId="315"/>
+        </pc:sldMkLst>
+        <pc:spChg chg="mod">
+          <ac:chgData name="Guest User" userId="S::urn:spo:anon#7745ecf66a1addff6472ab9ec02ce6695f8123e3cb45a3fe4b672b062b5a9943::" providerId="AD" clId="Web-{87D884D8-F19F-4267-BC00-AA9F81D2836D}" dt="2019-06-18T17:21:30.706" v="110" actId="20577"/>
+          <ac:spMkLst>
+            <pc:docMk/>
+            <pc:sldMk cId="1704287799" sldId="315"/>
+            <ac:spMk id="2" creationId="{024676C4-619A-4D81-BCA0-64E74755F1F8}"/>
+          </ac:spMkLst>
+        </pc:spChg>
+        <pc:spChg chg="add mod">
+          <ac:chgData name="Guest User" userId="S::urn:spo:anon#7745ecf66a1addff6472ab9ec02ce6695f8123e3cb45a3fe4b672b062b5a9943::" providerId="AD" clId="Web-{87D884D8-F19F-4267-BC00-AA9F81D2836D}" dt="2019-06-18T17:22:46.111" v="125" actId="14100"/>
+          <ac:spMkLst>
+            <pc:docMk/>
+            <pc:sldMk cId="1704287799" sldId="315"/>
+            <ac:spMk id="6" creationId="{4E60518B-4573-48BA-8E8B-1CC5387AC1BF}"/>
+          </ac:spMkLst>
+        </pc:spChg>
+        <pc:spChg chg="add mod">
+          <ac:chgData name="Guest User" userId="S::urn:spo:anon#7745ecf66a1addff6472ab9ec02ce6695f8123e3cb45a3fe4b672b062b5a9943::" providerId="AD" clId="Web-{87D884D8-F19F-4267-BC00-AA9F81D2836D}" dt="2019-06-18T17:24:25.673" v="223" actId="20577"/>
+          <ac:spMkLst>
+            <pc:docMk/>
+            <pc:sldMk cId="1704287799" sldId="315"/>
+            <ac:spMk id="7" creationId="{DADDBFF6-BFE3-4650-AE9B-C64E53C1CEB2}"/>
+          </ac:spMkLst>
+        </pc:spChg>
+        <pc:picChg chg="add mod">
+          <ac:chgData name="Guest User" userId="S::urn:spo:anon#7745ecf66a1addff6472ab9ec02ce6695f8123e3cb45a3fe4b672b062b5a9943::" providerId="AD" clId="Web-{87D884D8-F19F-4267-BC00-AA9F81D2836D}" dt="2019-06-18T17:22:53.252" v="126" actId="1076"/>
+          <ac:picMkLst>
+            <pc:docMk/>
+            <pc:sldMk cId="1704287799" sldId="315"/>
+            <ac:picMk id="3" creationId="{459106F1-3E60-4E4C-96E0-0A4A3D3BC141}"/>
+          </ac:picMkLst>
+        </pc:picChg>
+      </pc:sldChg>
+      <pc:sldChg chg="addSp delSp modSp new ord">
+        <pc:chgData name="Guest User" userId="S::urn:spo:anon#7745ecf66a1addff6472ab9ec02ce6695f8123e3cb45a3fe4b672b062b5a9943::" providerId="AD" clId="Web-{87D884D8-F19F-4267-BC00-AA9F81D2836D}" dt="2019-06-18T18:05:29.450" v="367"/>
+        <pc:sldMkLst>
+          <pc:docMk/>
+          <pc:sldMk cId="2111328435" sldId="316"/>
+        </pc:sldMkLst>
+        <pc:spChg chg="mod">
+          <ac:chgData name="Guest User" userId="S::urn:spo:anon#7745ecf66a1addff6472ab9ec02ce6695f8123e3cb45a3fe4b672b062b5a9943::" providerId="AD" clId="Web-{87D884D8-F19F-4267-BC00-AA9F81D2836D}" dt="2019-06-18T17:24:47.422" v="235" actId="20577"/>
+          <ac:spMkLst>
+            <pc:docMk/>
+            <pc:sldMk cId="2111328435" sldId="316"/>
+            <ac:spMk id="2" creationId="{496997CC-F4D4-4A42-89D8-A575E82CA66B}"/>
+          </ac:spMkLst>
+        </pc:spChg>
+        <pc:spChg chg="del">
+          <ac:chgData name="Guest User" userId="S::urn:spo:anon#7745ecf66a1addff6472ab9ec02ce6695f8123e3cb45a3fe4b672b062b5a9943::" providerId="AD" clId="Web-{87D884D8-F19F-4267-BC00-AA9F81D2836D}" dt="2019-06-18T17:44:39.014" v="238"/>
+          <ac:spMkLst>
+            <pc:docMk/>
+            <pc:sldMk cId="2111328435" sldId="316"/>
+            <ac:spMk id="3" creationId="{2B7B0C75-214F-4509-A899-D593A571FCB3}"/>
+          </ac:spMkLst>
+        </pc:spChg>
+        <pc:spChg chg="add mod">
+          <ac:chgData name="Guest User" userId="S::urn:spo:anon#7745ecf66a1addff6472ab9ec02ce6695f8123e3cb45a3fe4b672b062b5a9943::" providerId="AD" clId="Web-{87D884D8-F19F-4267-BC00-AA9F81D2836D}" dt="2019-06-18T17:45:37.063" v="297" actId="1076"/>
+          <ac:spMkLst>
+            <pc:docMk/>
+            <pc:sldMk cId="2111328435" sldId="316"/>
+            <ac:spMk id="4" creationId="{7E64672D-62E5-4AE9-8236-B4BF25202FFF}"/>
+          </ac:spMkLst>
+        </pc:spChg>
+        <pc:spChg chg="add mod">
+          <ac:chgData name="Guest User" userId="S::urn:spo:anon#7745ecf66a1addff6472ab9ec02ce6695f8123e3cb45a3fe4b672b062b5a9943::" providerId="AD" clId="Web-{87D884D8-F19F-4267-BC00-AA9F81D2836D}" dt="2019-06-18T17:45:44.860" v="306" actId="20577"/>
+          <ac:spMkLst>
+            <pc:docMk/>
+            <pc:sldMk cId="2111328435" sldId="316"/>
+            <ac:spMk id="6" creationId="{820AAD51-16A6-4C4A-B8DA-3700F4264227}"/>
+          </ac:spMkLst>
+        </pc:spChg>
+        <pc:spChg chg="add del">
+          <ac:chgData name="Guest User" userId="S::urn:spo:anon#7745ecf66a1addff6472ab9ec02ce6695f8123e3cb45a3fe4b672b062b5a9943::" providerId="AD" clId="Web-{87D884D8-F19F-4267-BC00-AA9F81D2836D}" dt="2019-06-18T17:46:02.313" v="310"/>
+          <ac:spMkLst>
+            <pc:docMk/>
+            <pc:sldMk cId="2111328435" sldId="316"/>
+            <ac:spMk id="8" creationId="{E54166F8-AA99-4B4C-8218-3DA4466AF51D}"/>
+          </ac:spMkLst>
+        </pc:spChg>
+        <pc:spChg chg="add mod">
+          <ac:chgData name="Guest User" userId="S::urn:spo:anon#7745ecf66a1addff6472ab9ec02ce6695f8123e3cb45a3fe4b672b062b5a9943::" providerId="AD" clId="Web-{87D884D8-F19F-4267-BC00-AA9F81D2836D}" dt="2019-06-18T17:46:28.173" v="341" actId="20577"/>
+          <ac:spMkLst>
+            <pc:docMk/>
+            <pc:sldMk cId="2111328435" sldId="316"/>
+            <ac:spMk id="9" creationId="{19BE1F02-5E9A-4165-AC1B-BF3615E70BAC}"/>
+          </ac:spMkLst>
+        </pc:spChg>
+        <pc:picChg chg="add del mod">
+          <ac:chgData name="Guest User" userId="S::urn:spo:anon#7745ecf66a1addff6472ab9ec02ce6695f8123e3cb45a3fe4b672b062b5a9943::" providerId="AD" clId="Web-{87D884D8-F19F-4267-BC00-AA9F81D2836D}" dt="2019-06-18T17:47:26.222" v="345"/>
+          <ac:picMkLst>
+            <pc:docMk/>
+            <pc:sldMk cId="2111328435" sldId="316"/>
+            <ac:picMk id="10" creationId="{193A2C24-2093-445B-BD9E-8A23314A150A}"/>
+          </ac:picMkLst>
+        </pc:picChg>
+        <pc:picChg chg="add mod">
+          <ac:chgData name="Guest User" userId="S::urn:spo:anon#7745ecf66a1addff6472ab9ec02ce6695f8123e3cb45a3fe4b672b062b5a9943::" providerId="AD" clId="Web-{87D884D8-F19F-4267-BC00-AA9F81D2836D}" dt="2019-06-18T17:48:20.130" v="348" actId="14100"/>
+          <ac:picMkLst>
+            <pc:docMk/>
+            <pc:sldMk cId="2111328435" sldId="316"/>
+            <ac:picMk id="12" creationId="{31F731F9-9944-4909-842F-A59649C80FB2}"/>
+          </ac:picMkLst>
+        </pc:picChg>
+      </pc:sldChg>
+      <pc:sldChg chg="addSp modSp new">
+        <pc:chgData name="Guest User" userId="S::urn:spo:anon#7745ecf66a1addff6472ab9ec02ce6695f8123e3cb45a3fe4b672b062b5a9943::" providerId="AD" clId="Web-{87D884D8-F19F-4267-BC00-AA9F81D2836D}" dt="2019-06-18T22:42:51.624" v="1149" actId="20577"/>
+        <pc:sldMkLst>
+          <pc:docMk/>
+          <pc:sldMk cId="1359770889" sldId="317"/>
+        </pc:sldMkLst>
+        <pc:spChg chg="mod">
+          <ac:chgData name="Guest User" userId="S::urn:spo:anon#7745ecf66a1addff6472ab9ec02ce6695f8123e3cb45a3fe4b672b062b5a9943::" providerId="AD" clId="Web-{87D884D8-F19F-4267-BC00-AA9F81D2836D}" dt="2019-06-18T17:49:28.351" v="364" actId="20577"/>
+          <ac:spMkLst>
+            <pc:docMk/>
+            <pc:sldMk cId="1359770889" sldId="317"/>
+            <ac:spMk id="2" creationId="{63621081-9FEC-463D-84E6-F7C0B532B576}"/>
+          </ac:spMkLst>
+        </pc:spChg>
+        <pc:spChg chg="mod">
+          <ac:chgData name="Guest User" userId="S::urn:spo:anon#7745ecf66a1addff6472ab9ec02ce6695f8123e3cb45a3fe4b672b062b5a9943::" providerId="AD" clId="Web-{87D884D8-F19F-4267-BC00-AA9F81D2836D}" dt="2019-06-18T22:42:51.624" v="1149" actId="20577"/>
+          <ac:spMkLst>
+            <pc:docMk/>
+            <pc:sldMk cId="1359770889" sldId="317"/>
+            <ac:spMk id="3" creationId="{95F297DF-ACDB-4040-840E-7F21692C6052}"/>
+          </ac:spMkLst>
+        </pc:spChg>
+        <pc:spChg chg="add mod">
+          <ac:chgData name="Guest User" userId="S::urn:spo:anon#7745ecf66a1addff6472ab9ec02ce6695f8123e3cb45a3fe4b672b062b5a9943::" providerId="AD" clId="Web-{87D884D8-F19F-4267-BC00-AA9F81D2836D}" dt="2019-06-18T22:40:38.155" v="897" actId="20577"/>
+          <ac:spMkLst>
+            <pc:docMk/>
+            <pc:sldMk cId="1359770889" sldId="317"/>
+            <ac:spMk id="5" creationId="{7F441B90-A56A-4A0E-B7BF-4283E3AF3FA0}"/>
+          </ac:spMkLst>
+        </pc:spChg>
+      </pc:sldChg>
+      <pc:sldChg chg="modSp new">
+        <pc:chgData name="Guest User" userId="S::urn:spo:anon#7745ecf66a1addff6472ab9ec02ce6695f8123e3cb45a3fe4b672b062b5a9943::" providerId="AD" clId="Web-{87D884D8-F19F-4267-BC00-AA9F81D2836D}" dt="2019-06-18T22:39:30.572" v="886" actId="20577"/>
+        <pc:sldMkLst>
+          <pc:docMk/>
+          <pc:sldMk cId="3703846539" sldId="318"/>
+        </pc:sldMkLst>
+        <pc:spChg chg="mod">
+          <ac:chgData name="Guest User" userId="S::urn:spo:anon#7745ecf66a1addff6472ab9ec02ce6695f8123e3cb45a3fe4b672b062b5a9943::" providerId="AD" clId="Web-{87D884D8-F19F-4267-BC00-AA9F81D2836D}" dt="2019-06-18T22:39:30.572" v="886" actId="20577"/>
+          <ac:spMkLst>
+            <pc:docMk/>
+            <pc:sldMk cId="3703846539" sldId="318"/>
+            <ac:spMk id="2" creationId="{78CA0602-A5E8-48C4-AD47-27756C6FE72B}"/>
+          </ac:spMkLst>
+        </pc:spChg>
+        <pc:spChg chg="mod">
+          <ac:chgData name="Guest User" userId="S::urn:spo:anon#7745ecf66a1addff6472ab9ec02ce6695f8123e3cb45a3fe4b672b062b5a9943::" providerId="AD" clId="Web-{87D884D8-F19F-4267-BC00-AA9F81D2836D}" dt="2019-06-18T22:39:23.447" v="879" actId="20577"/>
+          <ac:spMkLst>
+            <pc:docMk/>
+            <pc:sldMk cId="3703846539" sldId="318"/>
+            <ac:spMk id="3" creationId="{2C4F5FAB-E5EC-4788-9D6C-411059988A66}"/>
+          </ac:spMkLst>
+        </pc:spChg>
+      </pc:sldChg>
+    </pc:docChg>
+  </pc:docChgLst>
+  <pc:docChgLst>
+    <pc:chgData name="Guest User" userId="S::urn:spo:anon#7745ecf66a1addff6472ab9ec02ce6695f8123e3cb45a3fe4b672b062b5a9943::" providerId="AD" clId="Web-{2FEB6357-6CA3-BFCA-AD14-18DDEC69A950}"/>
+    <pc:docChg chg="addSld delSld modSld">
+      <pc:chgData name="Guest User" userId="S::urn:spo:anon#7745ecf66a1addff6472ab9ec02ce6695f8123e3cb45a3fe4b672b062b5a9943::" providerId="AD" clId="Web-{2FEB6357-6CA3-BFCA-AD14-18DDEC69A950}" dt="2019-06-19T04:35:43.026" v="81" actId="20577"/>
+      <pc:docMkLst>
+        <pc:docMk/>
+      </pc:docMkLst>
+      <pc:sldChg chg="modSp">
+        <pc:chgData name="Guest User" userId="S::urn:spo:anon#7745ecf66a1addff6472ab9ec02ce6695f8123e3cb45a3fe4b672b062b5a9943::" providerId="AD" clId="Web-{2FEB6357-6CA3-BFCA-AD14-18DDEC69A950}" dt="2019-06-19T04:35:43.026" v="80" actId="20577"/>
+        <pc:sldMkLst>
+          <pc:docMk/>
+          <pc:sldMk cId="3650977651" sldId="256"/>
+        </pc:sldMkLst>
+        <pc:spChg chg="mod">
+          <ac:chgData name="Guest User" userId="S::urn:spo:anon#7745ecf66a1addff6472ab9ec02ce6695f8123e3cb45a3fe4b672b062b5a9943::" providerId="AD" clId="Web-{2FEB6357-6CA3-BFCA-AD14-18DDEC69A950}" dt="2019-06-19T04:35:43.026" v="80" actId="20577"/>
+          <ac:spMkLst>
+            <pc:docMk/>
+            <pc:sldMk cId="3650977651" sldId="256"/>
+            <ac:spMk id="3" creationId="{964455FE-5BF8-4D31-8C77-1576F4363ACF}"/>
+          </ac:spMkLst>
+        </pc:spChg>
+      </pc:sldChg>
+      <pc:sldChg chg="delSp">
+        <pc:chgData name="Guest User" userId="S::urn:spo:anon#7745ecf66a1addff6472ab9ec02ce6695f8123e3cb45a3fe4b672b062b5a9943::" providerId="AD" clId="Web-{2FEB6357-6CA3-BFCA-AD14-18DDEC69A950}" dt="2019-06-19T04:31:03.087" v="76"/>
+        <pc:sldMkLst>
+          <pc:docMk/>
+          <pc:sldMk cId="2436657735" sldId="311"/>
+        </pc:sldMkLst>
+        <pc:spChg chg="del">
+          <ac:chgData name="Guest User" userId="S::urn:spo:anon#7745ecf66a1addff6472ab9ec02ce6695f8123e3cb45a3fe4b672b062b5a9943::" providerId="AD" clId="Web-{2FEB6357-6CA3-BFCA-AD14-18DDEC69A950}" dt="2019-06-19T04:31:03.087" v="76"/>
+          <ac:spMkLst>
+            <pc:docMk/>
+            <pc:sldMk cId="2436657735" sldId="311"/>
+            <ac:spMk id="5" creationId="{E5B32264-97E7-4692-BAC5-1174387C3639}"/>
+          </ac:spMkLst>
+        </pc:spChg>
+      </pc:sldChg>
+      <pc:sldChg chg="del">
+        <pc:chgData name="Guest User" userId="S::urn:spo:anon#7745ecf66a1addff6472ab9ec02ce6695f8123e3cb45a3fe4b672b062b5a9943::" providerId="AD" clId="Web-{2FEB6357-6CA3-BFCA-AD14-18DDEC69A950}" dt="2019-06-19T04:15:51.836" v="0"/>
+        <pc:sldMkLst>
+          <pc:docMk/>
+          <pc:sldMk cId="1011410958" sldId="312"/>
+        </pc:sldMkLst>
+      </pc:sldChg>
+      <pc:sldChg chg="modSp">
+        <pc:chgData name="Guest User" userId="S::urn:spo:anon#7745ecf66a1addff6472ab9ec02ce6695f8123e3cb45a3fe4b672b062b5a9943::" providerId="AD" clId="Web-{2FEB6357-6CA3-BFCA-AD14-18DDEC69A950}" dt="2019-06-19T04:17:52.979" v="13" actId="1076"/>
+        <pc:sldMkLst>
+          <pc:docMk/>
+          <pc:sldMk cId="1184984618" sldId="313"/>
+        </pc:sldMkLst>
+        <pc:spChg chg="mod">
+          <ac:chgData name="Guest User" userId="S::urn:spo:anon#7745ecf66a1addff6472ab9ec02ce6695f8123e3cb45a3fe4b672b062b5a9943::" providerId="AD" clId="Web-{2FEB6357-6CA3-BFCA-AD14-18DDEC69A950}" dt="2019-06-19T04:17:09.588" v="6" actId="1076"/>
+          <ac:spMkLst>
+            <pc:docMk/>
+            <pc:sldMk cId="1184984618" sldId="313"/>
+            <ac:spMk id="4" creationId="{35AEC8C5-DDD4-4DD8-8CDF-5D5E86FCC4FE}"/>
+          </ac:spMkLst>
+        </pc:spChg>
+        <pc:spChg chg="mod">
+          <ac:chgData name="Guest User" userId="S::urn:spo:anon#7745ecf66a1addff6472ab9ec02ce6695f8123e3cb45a3fe4b672b062b5a9943::" providerId="AD" clId="Web-{2FEB6357-6CA3-BFCA-AD14-18DDEC69A950}" dt="2019-06-19T04:16:04.508" v="1" actId="1076"/>
+          <ac:spMkLst>
+            <pc:docMk/>
+            <pc:sldMk cId="1184984618" sldId="313"/>
+            <ac:spMk id="6" creationId="{C104F682-F21D-4AF7-9280-6DD92411FABD}"/>
+          </ac:spMkLst>
+        </pc:spChg>
+        <pc:spChg chg="mod">
+          <ac:chgData name="Guest User" userId="S::urn:spo:anon#7745ecf66a1addff6472ab9ec02ce6695f8123e3cb45a3fe4b672b062b5a9943::" providerId="AD" clId="Web-{2FEB6357-6CA3-BFCA-AD14-18DDEC69A950}" dt="2019-06-19T04:17:49.104" v="12" actId="1076"/>
+          <ac:spMkLst>
+            <pc:docMk/>
+            <pc:sldMk cId="1184984618" sldId="313"/>
+            <ac:spMk id="12" creationId="{9359B53C-5FCE-4F3D-9632-410A8686DB64}"/>
+          </ac:spMkLst>
+        </pc:spChg>
+        <pc:spChg chg="mod">
+          <ac:chgData name="Guest User" userId="S::urn:spo:anon#7745ecf66a1addff6472ab9ec02ce6695f8123e3cb45a3fe4b672b062b5a9943::" providerId="AD" clId="Web-{2FEB6357-6CA3-BFCA-AD14-18DDEC69A950}" dt="2019-06-19T04:17:52.979" v="13" actId="1076"/>
+          <ac:spMkLst>
+            <pc:docMk/>
+            <pc:sldMk cId="1184984618" sldId="313"/>
+            <ac:spMk id="17" creationId="{0B4E8DB6-F680-4D44-B033-AFC82AAC2629}"/>
+          </ac:spMkLst>
+        </pc:spChg>
+        <pc:picChg chg="mod">
+          <ac:chgData name="Guest User" userId="S::urn:spo:anon#7745ecf66a1addff6472ab9ec02ce6695f8123e3cb45a3fe4b672b062b5a9943::" providerId="AD" clId="Web-{2FEB6357-6CA3-BFCA-AD14-18DDEC69A950}" dt="2019-06-19T04:17:43.119" v="11" actId="1076"/>
+          <ac:picMkLst>
+            <pc:docMk/>
+            <pc:sldMk cId="1184984618" sldId="313"/>
+            <ac:picMk id="5" creationId="{A67642C9-25FE-4EDD-8135-E8854244A836}"/>
+          </ac:picMkLst>
+        </pc:picChg>
+        <pc:picChg chg="mod">
+          <ac:chgData name="Guest User" userId="S::urn:spo:anon#7745ecf66a1addff6472ab9ec02ce6695f8123e3cb45a3fe4b672b062b5a9943::" providerId="AD" clId="Web-{2FEB6357-6CA3-BFCA-AD14-18DDEC69A950}" dt="2019-06-19T04:17:24.525" v="8" actId="1076"/>
+          <ac:picMkLst>
+            <pc:docMk/>
+            <pc:sldMk cId="1184984618" sldId="313"/>
+            <ac:picMk id="14" creationId="{D33C9AAF-2D66-4CB0-BD4D-0CF5FBE76AEA}"/>
+          </ac:picMkLst>
+        </pc:picChg>
+        <pc:picChg chg="mod">
+          <ac:chgData name="Guest User" userId="S::urn:spo:anon#7745ecf66a1addff6472ab9ec02ce6695f8123e3cb45a3fe4b672b062b5a9943::" providerId="AD" clId="Web-{2FEB6357-6CA3-BFCA-AD14-18DDEC69A950}" dt="2019-06-19T04:16:53.400" v="3" actId="1076"/>
+          <ac:picMkLst>
+            <pc:docMk/>
+            <pc:sldMk cId="1184984618" sldId="313"/>
+            <ac:picMk id="15" creationId="{EBB82E8D-6662-4B01-BCAF-3CCE393BB901}"/>
+          </ac:picMkLst>
+        </pc:picChg>
+        <pc:picChg chg="mod">
+          <ac:chgData name="Guest User" userId="S::urn:spo:anon#7745ecf66a1addff6472ab9ec02ce6695f8123e3cb45a3fe4b672b062b5a9943::" providerId="AD" clId="Web-{2FEB6357-6CA3-BFCA-AD14-18DDEC69A950}" dt="2019-06-19T04:17:39.025" v="10" actId="1076"/>
+          <ac:picMkLst>
+            <pc:docMk/>
+            <pc:sldMk cId="1184984618" sldId="313"/>
+            <ac:picMk id="16" creationId="{CBB0F800-48A2-4A8A-8865-D8AF35CE00F8}"/>
+          </ac:picMkLst>
+        </pc:picChg>
+        <pc:cxnChg chg="mod">
+          <ac:chgData name="Guest User" userId="S::urn:spo:anon#7745ecf66a1addff6472ab9ec02ce6695f8123e3cb45a3fe4b672b062b5a9943::" providerId="AD" clId="Web-{2FEB6357-6CA3-BFCA-AD14-18DDEC69A950}" dt="2019-06-19T04:16:57.119" v="4" actId="1076"/>
+          <ac:cxnSpMkLst>
+            <pc:docMk/>
+            <pc:sldMk cId="1184984618" sldId="313"/>
+            <ac:cxnSpMk id="7" creationId="{47C58D17-8FD2-4590-8B98-B15A5431ED4C}"/>
+          </ac:cxnSpMkLst>
+        </pc:cxnChg>
+        <pc:cxnChg chg="mod">
+          <ac:chgData name="Guest User" userId="S::urn:spo:anon#7745ecf66a1addff6472ab9ec02ce6695f8123e3cb45a3fe4b672b062b5a9943::" providerId="AD" clId="Web-{2FEB6357-6CA3-BFCA-AD14-18DDEC69A950}" dt="2019-06-19T04:17:34.213" v="9" actId="1076"/>
+          <ac:cxnSpMkLst>
+            <pc:docMk/>
+            <pc:sldMk cId="1184984618" sldId="313"/>
+            <ac:cxnSpMk id="8" creationId="{5354F70C-134D-4277-AACA-4BDE02327293}"/>
+          </ac:cxnSpMkLst>
+        </pc:cxnChg>
+      </pc:sldChg>
+      <pc:sldChg chg="addSp delSp modSp mod setBg">
+        <pc:chgData name="Guest User" userId="S::urn:spo:anon#7745ecf66a1addff6472ab9ec02ce6695f8123e3cb45a3fe4b672b062b5a9943::" providerId="AD" clId="Web-{2FEB6357-6CA3-BFCA-AD14-18DDEC69A950}" dt="2019-06-19T04:31:04.649" v="77"/>
+        <pc:sldMkLst>
+          <pc:docMk/>
+          <pc:sldMk cId="3703846539" sldId="318"/>
+        </pc:sldMkLst>
+        <pc:spChg chg="mod">
+          <ac:chgData name="Guest User" userId="S::urn:spo:anon#7745ecf66a1addff6472ab9ec02ce6695f8123e3cb45a3fe4b672b062b5a9943::" providerId="AD" clId="Web-{2FEB6357-6CA3-BFCA-AD14-18DDEC69A950}" dt="2019-06-19T04:29:44.305" v="66"/>
+          <ac:spMkLst>
+            <pc:docMk/>
+            <pc:sldMk cId="3703846539" sldId="318"/>
+            <ac:spMk id="2" creationId="{78CA0602-A5E8-48C4-AD47-27756C6FE72B}"/>
+          </ac:spMkLst>
+        </pc:spChg>
+        <pc:spChg chg="mod ord">
+          <ac:chgData name="Guest User" userId="S::urn:spo:anon#7745ecf66a1addff6472ab9ec02ce6695f8123e3cb45a3fe4b672b062b5a9943::" providerId="AD" clId="Web-{2FEB6357-6CA3-BFCA-AD14-18DDEC69A950}" dt="2019-06-19T04:30:30.305" v="75" actId="20577"/>
+          <ac:spMkLst>
+            <pc:docMk/>
+            <pc:sldMk cId="3703846539" sldId="318"/>
+            <ac:spMk id="3" creationId="{2C4F5FAB-E5EC-4788-9D6C-411059988A66}"/>
+          </ac:spMkLst>
+        </pc:spChg>
+        <pc:spChg chg="add">
+          <ac:chgData name="Guest User" userId="S::urn:spo:anon#7745ecf66a1addff6472ab9ec02ce6695f8123e3cb45a3fe4b672b062b5a9943::" providerId="AD" clId="Web-{2FEB6357-6CA3-BFCA-AD14-18DDEC69A950}" dt="2019-06-19T04:31:04.649" v="77"/>
+          <ac:spMkLst>
+            <pc:docMk/>
+            <pc:sldMk cId="3703846539" sldId="318"/>
+            <ac:spMk id="7" creationId="{E55A1FC0-8E30-4FAB-B566-BDFED0EBDD27}"/>
+          </ac:spMkLst>
+        </pc:spChg>
+        <pc:picChg chg="add mod">
+          <ac:chgData name="Guest User" userId="S::urn:spo:anon#7745ecf66a1addff6472ab9ec02ce6695f8123e3cb45a3fe4b672b062b5a9943::" providerId="AD" clId="Web-{2FEB6357-6CA3-BFCA-AD14-18DDEC69A950}" dt="2019-06-19T04:30:16.805" v="69" actId="1076"/>
+          <ac:picMkLst>
+            <pc:docMk/>
+            <pc:sldMk cId="3703846539" sldId="318"/>
+            <ac:picMk id="4" creationId="{81E8A417-E551-456F-AEE0-05D6DC994040}"/>
+          </ac:picMkLst>
+        </pc:picChg>
+        <pc:cxnChg chg="add del">
+          <ac:chgData name="Guest User" userId="S::urn:spo:anon#7745ecf66a1addff6472ab9ec02ce6695f8123e3cb45a3fe4b672b062b5a9943::" providerId="AD" clId="Web-{2FEB6357-6CA3-BFCA-AD14-18DDEC69A950}" dt="2019-06-19T04:29:44.305" v="66"/>
+          <ac:cxnSpMkLst>
+            <pc:docMk/>
+            <pc:sldMk cId="3703846539" sldId="318"/>
+            <ac:cxnSpMk id="9" creationId="{39B7FDC9-F0CE-43A7-9F2A-83DD09DC3453}"/>
+          </ac:cxnSpMkLst>
+        </pc:cxnChg>
+      </pc:sldChg>
+      <pc:sldChg chg="addSp delSp modSp new">
+        <pc:chgData name="Guest User" userId="S::urn:spo:anon#7745ecf66a1addff6472ab9ec02ce6695f8123e3cb45a3fe4b672b062b5a9943::" providerId="AD" clId="Web-{2FEB6357-6CA3-BFCA-AD14-18DDEC69A950}" dt="2019-06-19T04:27:06.694" v="57" actId="20577"/>
+        <pc:sldMkLst>
+          <pc:docMk/>
+          <pc:sldMk cId="3013494589" sldId="319"/>
+        </pc:sldMkLst>
+        <pc:spChg chg="mod">
+          <ac:chgData name="Guest User" userId="S::urn:spo:anon#7745ecf66a1addff6472ab9ec02ce6695f8123e3cb45a3fe4b672b062b5a9943::" providerId="AD" clId="Web-{2FEB6357-6CA3-BFCA-AD14-18DDEC69A950}" dt="2019-06-19T04:27:06.694" v="57" actId="20577"/>
+          <ac:spMkLst>
+            <pc:docMk/>
+            <pc:sldMk cId="3013494589" sldId="319"/>
+            <ac:spMk id="2" creationId="{D851CCC7-3AFD-4D34-A74C-1C7BD78DE398}"/>
+          </ac:spMkLst>
+        </pc:spChg>
+        <pc:spChg chg="del">
+          <ac:chgData name="Guest User" userId="S::urn:spo:anon#7745ecf66a1addff6472ab9ec02ce6695f8123e3cb45a3fe4b672b062b5a9943::" providerId="AD" clId="Web-{2FEB6357-6CA3-BFCA-AD14-18DDEC69A950}" dt="2019-06-19T04:23:29.751" v="27"/>
+          <ac:spMkLst>
+            <pc:docMk/>
+            <pc:sldMk cId="3013494589" sldId="319"/>
+            <ac:spMk id="3" creationId="{24A7A460-148B-4405-A1B2-15DEA47D8943}"/>
+          </ac:spMkLst>
+        </pc:spChg>
+        <pc:spChg chg="add del mod">
+          <ac:chgData name="Guest User" userId="S::urn:spo:anon#7745ecf66a1addff6472ab9ec02ce6695f8123e3cb45a3fe4b672b062b5a9943::" providerId="AD" clId="Web-{2FEB6357-6CA3-BFCA-AD14-18DDEC69A950}" dt="2019-06-19T04:23:46.970" v="29"/>
+          <ac:spMkLst>
+            <pc:docMk/>
+            <pc:sldMk cId="3013494589" sldId="319"/>
+            <ac:spMk id="7" creationId="{CADFB8DE-B0CF-420E-8680-E30B704AC5AA}"/>
+          </ac:spMkLst>
+        </pc:spChg>
+        <pc:spChg chg="add del mod">
+          <ac:chgData name="Guest User" userId="S::urn:spo:anon#7745ecf66a1addff6472ab9ec02ce6695f8123e3cb45a3fe4b672b062b5a9943::" providerId="AD" clId="Web-{2FEB6357-6CA3-BFCA-AD14-18DDEC69A950}" dt="2019-06-19T04:24:40.037" v="37"/>
+          <ac:spMkLst>
+            <pc:docMk/>
+            <pc:sldMk cId="3013494589" sldId="319"/>
+            <ac:spMk id="11" creationId="{C5236FB4-B175-4E80-BF87-919BF6171CF3}"/>
+          </ac:spMkLst>
+        </pc:spChg>
+        <pc:spChg chg="add del mod">
+          <ac:chgData name="Guest User" userId="S::urn:spo:anon#7745ecf66a1addff6472ab9ec02ce6695f8123e3cb45a3fe4b672b062b5a9943::" providerId="AD" clId="Web-{2FEB6357-6CA3-BFCA-AD14-18DDEC69A950}" dt="2019-06-19T04:26:27.069" v="49"/>
+          <ac:spMkLst>
+            <pc:docMk/>
+            <pc:sldMk cId="3013494589" sldId="319"/>
+            <ac:spMk id="17" creationId="{58E7E8F1-9BED-4F5E-9041-7093926BFD15}"/>
+          </ac:spMkLst>
+        </pc:spChg>
+        <pc:spChg chg="add mod">
+          <ac:chgData name="Guest User" userId="S::urn:spo:anon#7745ecf66a1addff6472ab9ec02ce6695f8123e3cb45a3fe4b672b062b5a9943::" providerId="AD" clId="Web-{2FEB6357-6CA3-BFCA-AD14-18DDEC69A950}" dt="2019-06-19T04:26:57.522" v="54" actId="20577"/>
+          <ac:spMkLst>
+            <pc:docMk/>
+            <pc:sldMk cId="3013494589" sldId="319"/>
+            <ac:spMk id="21" creationId="{5552AD80-07BC-4498-AFF7-F455F2EC2534}"/>
+          </ac:spMkLst>
+        </pc:spChg>
+        <pc:graphicFrameChg chg="add del mod ord modGraphic">
+          <ac:chgData name="Guest User" userId="S::urn:spo:anon#7745ecf66a1addff6472ab9ec02ce6695f8123e3cb45a3fe4b672b062b5a9943::" providerId="AD" clId="Web-{2FEB6357-6CA3-BFCA-AD14-18DDEC69A950}" dt="2019-06-19T04:24:34.127" v="36"/>
+          <ac:graphicFrameMkLst>
+            <pc:docMk/>
+            <pc:sldMk cId="3013494589" sldId="319"/>
+            <ac:graphicFrameMk id="12" creationId="{D643417E-3FC5-4F74-A0AB-2E6E65A10AF4}"/>
+          </ac:graphicFrameMkLst>
+        </pc:graphicFrameChg>
+        <pc:graphicFrameChg chg="add del mod ord modGraphic">
+          <ac:chgData name="Guest User" userId="S::urn:spo:anon#7745ecf66a1addff6472ab9ec02ce6695f8123e3cb45a3fe4b672b062b5a9943::" providerId="AD" clId="Web-{2FEB6357-6CA3-BFCA-AD14-18DDEC69A950}" dt="2019-06-19T04:26:19.257" v="48"/>
+          <ac:graphicFrameMkLst>
+            <pc:docMk/>
+            <pc:sldMk cId="3013494589" sldId="319"/>
+            <ac:graphicFrameMk id="14" creationId="{745E287D-CF96-48AF-A279-9F5B2E880B02}"/>
+          </ac:graphicFrameMkLst>
+        </pc:graphicFrameChg>
+        <pc:picChg chg="add del mod ord">
+          <ac:chgData name="Guest User" userId="S::urn:spo:anon#7745ecf66a1addff6472ab9ec02ce6695f8123e3cb45a3fe4b672b062b5a9943::" providerId="AD" clId="Web-{2FEB6357-6CA3-BFCA-AD14-18DDEC69A950}" dt="2019-06-19T04:23:40.079" v="28"/>
+          <ac:picMkLst>
+            <pc:docMk/>
+            <pc:sldMk cId="3013494589" sldId="319"/>
+            <ac:picMk id="4" creationId="{4F994BEF-F57B-4CAB-AA79-334C11E93025}"/>
+          </ac:picMkLst>
+        </pc:picChg>
+        <pc:picChg chg="add del mod ord">
+          <ac:chgData name="Guest User" userId="S::urn:spo:anon#7745ecf66a1addff6472ab9ec02ce6695f8123e3cb45a3fe4b672b062b5a9943::" providerId="AD" clId="Web-{2FEB6357-6CA3-BFCA-AD14-18DDEC69A950}" dt="2019-06-19T04:24:19.814" v="34"/>
+          <ac:picMkLst>
+            <pc:docMk/>
+            <pc:sldMk cId="3013494589" sldId="319"/>
+            <ac:picMk id="8" creationId="{C547B736-84F2-451B-AD71-B39789AB1DA4}"/>
+          </ac:picMkLst>
+        </pc:picChg>
+        <pc:picChg chg="add mod ord">
+          <ac:chgData name="Guest User" userId="S::urn:spo:anon#7745ecf66a1addff6472ab9ec02ce6695f8123e3cb45a3fe4b672b062b5a9943::" providerId="AD" clId="Web-{2FEB6357-6CA3-BFCA-AD14-18DDEC69A950}" dt="2019-06-19T04:26:38.507" v="52" actId="1076"/>
+          <ac:picMkLst>
+            <pc:docMk/>
+            <pc:sldMk cId="3013494589" sldId="319"/>
+            <ac:picMk id="18" creationId="{D030A37E-9C1F-4E75-9ECE-6411C99E5A0F}"/>
+          </ac:picMkLst>
+        </pc:picChg>
+      </pc:sldChg>
+    </pc:docChg>
+  </pc:docChgLst>
+  <pc:docChgLst>
+    <pc:chgData name="Anton Kalcik" userId="2da22a33-fb39-430b-b264-5213e7c03a2d" providerId="ADAL" clId="{74644EFD-C0FD-44ED-962D-5CF4571A1EC9}"/>
+    <pc:docChg chg="undo modSld sldOrd">
+      <pc:chgData name="Anton Kalcik" userId="2da22a33-fb39-430b-b264-5213e7c03a2d" providerId="ADAL" clId="{74644EFD-C0FD-44ED-962D-5CF4571A1EC9}" dt="2019-06-19T06:27:13.202" v="130"/>
+      <pc:docMkLst>
+        <pc:docMk/>
+      </pc:docMkLst>
+      <pc:sldChg chg="modSp">
+        <pc:chgData name="Anton Kalcik" userId="2da22a33-fb39-430b-b264-5213e7c03a2d" providerId="ADAL" clId="{74644EFD-C0FD-44ED-962D-5CF4571A1EC9}" dt="2019-06-18T21:12:41.039" v="129" actId="20577"/>
+        <pc:sldMkLst>
+          <pc:docMk/>
+          <pc:sldMk cId="2436657735" sldId="311"/>
+        </pc:sldMkLst>
+        <pc:spChg chg="mod">
+          <ac:chgData name="Anton Kalcik" userId="2da22a33-fb39-430b-b264-5213e7c03a2d" providerId="ADAL" clId="{74644EFD-C0FD-44ED-962D-5CF4571A1EC9}" dt="2019-06-18T21:12:41.039" v="129" actId="20577"/>
+          <ac:spMkLst>
+            <pc:docMk/>
+            <pc:sldMk cId="2436657735" sldId="311"/>
+            <ac:spMk id="3" creationId="{F6226924-C648-4835-9DB0-7C2A9AD42C94}"/>
+          </ac:spMkLst>
+        </pc:spChg>
+      </pc:sldChg>
+      <pc:sldChg chg="modSp ord modTransition">
+        <pc:chgData name="Anton Kalcik" userId="2da22a33-fb39-430b-b264-5213e7c03a2d" providerId="ADAL" clId="{74644EFD-C0FD-44ED-962D-5CF4571A1EC9}" dt="2019-06-18T18:10:12.037" v="3"/>
+        <pc:sldMkLst>
+          <pc:docMk/>
+          <pc:sldMk cId="1184984618" sldId="313"/>
+        </pc:sldMkLst>
+        <pc:spChg chg="mod">
+          <ac:chgData name="Anton Kalcik" userId="2da22a33-fb39-430b-b264-5213e7c03a2d" providerId="ADAL" clId="{74644EFD-C0FD-44ED-962D-5CF4571A1EC9}" dt="2019-06-18T17:01:02.757" v="0" actId="1076"/>
+          <ac:spMkLst>
+            <pc:docMk/>
+            <pc:sldMk cId="1184984618" sldId="313"/>
+            <ac:spMk id="4" creationId="{35AEC8C5-DDD4-4DD8-8CDF-5D5E86FCC4FE}"/>
+          </ac:spMkLst>
+        </pc:spChg>
+        <pc:spChg chg="mod">
+          <ac:chgData name="Anton Kalcik" userId="2da22a33-fb39-430b-b264-5213e7c03a2d" providerId="ADAL" clId="{74644EFD-C0FD-44ED-962D-5CF4571A1EC9}" dt="2019-06-18T17:01:02.757" v="0" actId="1076"/>
+          <ac:spMkLst>
+            <pc:docMk/>
+            <pc:sldMk cId="1184984618" sldId="313"/>
+            <ac:spMk id="6" creationId="{C104F682-F21D-4AF7-9280-6DD92411FABD}"/>
+          </ac:spMkLst>
+        </pc:spChg>
+        <pc:spChg chg="mod">
+          <ac:chgData name="Anton Kalcik" userId="2da22a33-fb39-430b-b264-5213e7c03a2d" providerId="ADAL" clId="{74644EFD-C0FD-44ED-962D-5CF4571A1EC9}" dt="2019-06-18T17:01:02.757" v="0" actId="1076"/>
+          <ac:spMkLst>
+            <pc:docMk/>
+            <pc:sldMk cId="1184984618" sldId="313"/>
+            <ac:spMk id="12" creationId="{9359B53C-5FCE-4F3D-9632-410A8686DB64}"/>
+          </ac:spMkLst>
+        </pc:spChg>
+        <pc:spChg chg="mod">
+          <ac:chgData name="Anton Kalcik" userId="2da22a33-fb39-430b-b264-5213e7c03a2d" providerId="ADAL" clId="{74644EFD-C0FD-44ED-962D-5CF4571A1EC9}" dt="2019-06-18T17:01:02.757" v="0" actId="1076"/>
+          <ac:spMkLst>
+            <pc:docMk/>
+            <pc:sldMk cId="1184984618" sldId="313"/>
+            <ac:spMk id="17" creationId="{0B4E8DB6-F680-4D44-B033-AFC82AAC2629}"/>
+          </ac:spMkLst>
+        </pc:spChg>
+        <pc:picChg chg="mod">
+          <ac:chgData name="Anton Kalcik" userId="2da22a33-fb39-430b-b264-5213e7c03a2d" providerId="ADAL" clId="{74644EFD-C0FD-44ED-962D-5CF4571A1EC9}" dt="2019-06-18T17:01:02.757" v="0" actId="1076"/>
+          <ac:picMkLst>
+            <pc:docMk/>
+            <pc:sldMk cId="1184984618" sldId="313"/>
+            <ac:picMk id="5" creationId="{A67642C9-25FE-4EDD-8135-E8854244A836}"/>
+          </ac:picMkLst>
+        </pc:picChg>
+        <pc:picChg chg="mod">
+          <ac:chgData name="Anton Kalcik" userId="2da22a33-fb39-430b-b264-5213e7c03a2d" providerId="ADAL" clId="{74644EFD-C0FD-44ED-962D-5CF4571A1EC9}" dt="2019-06-18T17:01:02.757" v="0" actId="1076"/>
+          <ac:picMkLst>
+            <pc:docMk/>
+            <pc:sldMk cId="1184984618" sldId="313"/>
+            <ac:picMk id="14" creationId="{D33C9AAF-2D66-4CB0-BD4D-0CF5FBE76AEA}"/>
+          </ac:picMkLst>
+        </pc:picChg>
+        <pc:picChg chg="mod">
+          <ac:chgData name="Anton Kalcik" userId="2da22a33-fb39-430b-b264-5213e7c03a2d" providerId="ADAL" clId="{74644EFD-C0FD-44ED-962D-5CF4571A1EC9}" dt="2019-06-18T17:01:02.757" v="0" actId="1076"/>
+          <ac:picMkLst>
+            <pc:docMk/>
+            <pc:sldMk cId="1184984618" sldId="313"/>
+            <ac:picMk id="15" creationId="{EBB82E8D-6662-4B01-BCAF-3CCE393BB901}"/>
+          </ac:picMkLst>
+        </pc:picChg>
+        <pc:picChg chg="mod">
+          <ac:chgData name="Anton Kalcik" userId="2da22a33-fb39-430b-b264-5213e7c03a2d" providerId="ADAL" clId="{74644EFD-C0FD-44ED-962D-5CF4571A1EC9}" dt="2019-06-18T17:01:02.757" v="0" actId="1076"/>
+          <ac:picMkLst>
+            <pc:docMk/>
+            <pc:sldMk cId="1184984618" sldId="313"/>
+            <ac:picMk id="16" creationId="{CBB0F800-48A2-4A8A-8865-D8AF35CE00F8}"/>
+          </ac:picMkLst>
+        </pc:picChg>
+        <pc:cxnChg chg="mod">
+          <ac:chgData name="Anton Kalcik" userId="2da22a33-fb39-430b-b264-5213e7c03a2d" providerId="ADAL" clId="{74644EFD-C0FD-44ED-962D-5CF4571A1EC9}" dt="2019-06-18T17:01:02.757" v="0" actId="1076"/>
+          <ac:cxnSpMkLst>
+            <pc:docMk/>
+            <pc:sldMk cId="1184984618" sldId="313"/>
+            <ac:cxnSpMk id="7" creationId="{47C58D17-8FD2-4590-8B98-B15A5431ED4C}"/>
+          </ac:cxnSpMkLst>
+        </pc:cxnChg>
+        <pc:cxnChg chg="mod">
+          <ac:chgData name="Anton Kalcik" userId="2da22a33-fb39-430b-b264-5213e7c03a2d" providerId="ADAL" clId="{74644EFD-C0FD-44ED-962D-5CF4571A1EC9}" dt="2019-06-18T17:01:02.757" v="0" actId="1076"/>
+          <ac:cxnSpMkLst>
+            <pc:docMk/>
+            <pc:sldMk cId="1184984618" sldId="313"/>
+            <ac:cxnSpMk id="8" creationId="{5354F70C-134D-4277-AACA-4BDE02327293}"/>
+          </ac:cxnSpMkLst>
+        </pc:cxnChg>
+      </pc:sldChg>
+      <pc:sldChg chg="ord">
+        <pc:chgData name="Anton Kalcik" userId="2da22a33-fb39-430b-b264-5213e7c03a2d" providerId="ADAL" clId="{74644EFD-C0FD-44ED-962D-5CF4571A1EC9}" dt="2019-06-19T06:27:13.202" v="130"/>
+        <pc:sldMkLst>
+          <pc:docMk/>
+          <pc:sldMk cId="1359770889" sldId="317"/>
+        </pc:sldMkLst>
+      </pc:sldChg>
+    </pc:docChg>
+  </pc:docChgLst>
+</pc:chgInfo>
+</file>
+
 <file path=ppt/notesMasters/notesMaster1.xml><?xml version="1.0" encoding="utf-8"?>
 <p:notesMaster xmlns:a="http://schemas.openxmlformats.org/drawingml/2006/main" xmlns:r="http://schemas.openxmlformats.org/officeDocument/2006/relationships" xmlns:p="http://schemas.openxmlformats.org/presentationml/2006/main">
   <p:cSld>
@@ -201,7 +833,7 @@
           <a:p>
             <a:fld id="{FF084CBC-36E0-4CC0-918D-767D7E309F2F}" type="datetimeFigureOut">
               <a:rPr lang="en-US" smtClean="0"/>
-              <a:t>6/18/2019</a:t>
+              <a:t>6/19/2019</a:t>
             </a:fld>
             <a:endParaRPr lang="en-US"/>
           </a:p>
@@ -615,7 +1247,7 @@
           <a:p>
             <a:fld id="{8272ECE3-2878-47BE-B879-BFDD2207B1DF}" type="datetimeFigureOut">
               <a:rPr lang="en-US" smtClean="0"/>
-              <a:t>6/18/2019</a:t>
+              <a:t>6/19/2019</a:t>
             </a:fld>
             <a:endParaRPr lang="en-US"/>
           </a:p>
@@ -813,7 +1445,7 @@
           <a:p>
             <a:fld id="{8272ECE3-2878-47BE-B879-BFDD2207B1DF}" type="datetimeFigureOut">
               <a:rPr lang="en-US" smtClean="0"/>
-              <a:t>6/18/2019</a:t>
+              <a:t>6/19/2019</a:t>
             </a:fld>
             <a:endParaRPr lang="en-US"/>
           </a:p>
@@ -1021,7 +1653,7 @@
           <a:p>
             <a:fld id="{8272ECE3-2878-47BE-B879-BFDD2207B1DF}" type="datetimeFigureOut">
               <a:rPr lang="en-US" smtClean="0"/>
-              <a:t>6/18/2019</a:t>
+              <a:t>6/19/2019</a:t>
             </a:fld>
             <a:endParaRPr lang="en-US"/>
           </a:p>
@@ -1219,7 +1851,7 @@
           <a:p>
             <a:fld id="{8272ECE3-2878-47BE-B879-BFDD2207B1DF}" type="datetimeFigureOut">
               <a:rPr lang="en-US" smtClean="0"/>
-              <a:t>6/18/2019</a:t>
+              <a:t>6/19/2019</a:t>
             </a:fld>
             <a:endParaRPr lang="en-US"/>
           </a:p>
@@ -1494,7 +2126,7 @@
           <a:p>
             <a:fld id="{8272ECE3-2878-47BE-B879-BFDD2207B1DF}" type="datetimeFigureOut">
               <a:rPr lang="en-US" smtClean="0"/>
-              <a:t>6/18/2019</a:t>
+              <a:t>6/19/2019</a:t>
             </a:fld>
             <a:endParaRPr lang="en-US"/>
           </a:p>
@@ -1759,7 +2391,7 @@
           <a:p>
             <a:fld id="{8272ECE3-2878-47BE-B879-BFDD2207B1DF}" type="datetimeFigureOut">
               <a:rPr lang="en-US" smtClean="0"/>
-              <a:t>6/18/2019</a:t>
+              <a:t>6/19/2019</a:t>
             </a:fld>
             <a:endParaRPr lang="en-US"/>
           </a:p>
@@ -2171,7 +2803,7 @@
           <a:p>
             <a:fld id="{8272ECE3-2878-47BE-B879-BFDD2207B1DF}" type="datetimeFigureOut">
               <a:rPr lang="en-US" smtClean="0"/>
-              <a:t>6/18/2019</a:t>
+              <a:t>6/19/2019</a:t>
             </a:fld>
             <a:endParaRPr lang="en-US"/>
           </a:p>
@@ -2312,7 +2944,7 @@
           <a:p>
             <a:fld id="{8272ECE3-2878-47BE-B879-BFDD2207B1DF}" type="datetimeFigureOut">
               <a:rPr lang="en-US" smtClean="0"/>
-              <a:t>6/18/2019</a:t>
+              <a:t>6/19/2019</a:t>
             </a:fld>
             <a:endParaRPr lang="en-US"/>
           </a:p>
@@ -2425,7 +3057,7 @@
           <a:p>
             <a:fld id="{8272ECE3-2878-47BE-B879-BFDD2207B1DF}" type="datetimeFigureOut">
               <a:rPr lang="en-US" smtClean="0"/>
-              <a:t>6/18/2019</a:t>
+              <a:t>6/19/2019</a:t>
             </a:fld>
             <a:endParaRPr lang="en-US"/>
           </a:p>
@@ -2736,7 +3368,7 @@
           <a:p>
             <a:fld id="{8272ECE3-2878-47BE-B879-BFDD2207B1DF}" type="datetimeFigureOut">
               <a:rPr lang="en-US" smtClean="0"/>
-              <a:t>6/18/2019</a:t>
+              <a:t>6/19/2019</a:t>
             </a:fld>
             <a:endParaRPr lang="en-US"/>
           </a:p>
@@ -3024,7 +3656,7 @@
           <a:p>
             <a:fld id="{8272ECE3-2878-47BE-B879-BFDD2207B1DF}" type="datetimeFigureOut">
               <a:rPr lang="en-US" smtClean="0"/>
-              <a:t>6/18/2019</a:t>
+              <a:t>6/19/2019</a:t>
             </a:fld>
             <a:endParaRPr lang="en-US"/>
           </a:p>
@@ -3265,7 +3897,7 @@
           <a:p>
             <a:fld id="{8272ECE3-2878-47BE-B879-BFDD2207B1DF}" type="datetimeFigureOut">
               <a:rPr lang="en-US" smtClean="0"/>
-              <a:t>6/18/2019</a:t>
+              <a:t>6/19/2019</a:t>
             </a:fld>
             <a:endParaRPr lang="en-US"/>
           </a:p>
@@ -3729,9 +4361,25 @@
         </p:nvSpPr>
         <p:spPr/>
         <p:txBody>
-          <a:bodyPr/>
+          <a:bodyPr vert="horz" lIns="91440" tIns="45720" rIns="91440" bIns="45720" rtlCol="0" anchor="t">
+            <a:normAutofit/>
+          </a:bodyPr>
           <a:lstStyle/>
           <a:p>
+            <a:r>
+              <a:rPr lang="en-US" dirty="0" err="1">
+                <a:ea typeface="+mn-lt"/>
+                <a:cs typeface="+mn-lt"/>
+              </a:rPr>
+              <a:t>Warum</a:t>
+            </a:r>
+            <a:r>
+              <a:rPr lang="en-US" dirty="0">
+                <a:ea typeface="+mn-lt"/>
+                <a:cs typeface="+mn-lt"/>
+              </a:rPr>
+              <a:t>, Was, Wie?</a:t>
+            </a:r>
             <a:endParaRPr lang="en-US" dirty="0"/>
           </a:p>
         </p:txBody>
@@ -3740,6 +4388,307 @@
     <p:extLst>
       <p:ext uri="{BB962C8B-B14F-4D97-AF65-F5344CB8AC3E}">
         <p14:creationId xmlns:p14="http://schemas.microsoft.com/office/powerpoint/2010/main" val="3650977651"/>
+      </p:ext>
+    </p:extLst>
+  </p:cSld>
+  <p:clrMapOvr>
+    <a:masterClrMapping/>
+  </p:clrMapOvr>
+</p:sld>
+</file>
+
+<file path=ppt/slides/slide10.xml><?xml version="1.0" encoding="utf-8"?>
+<p:sld xmlns:a="http://schemas.openxmlformats.org/drawingml/2006/main" xmlns:r="http://schemas.openxmlformats.org/officeDocument/2006/relationships" xmlns:p="http://schemas.openxmlformats.org/presentationml/2006/main">
+  <p:cSld>
+    <p:spTree>
+      <p:nvGrpSpPr>
+        <p:cNvPr id="1" name=""/>
+        <p:cNvGrpSpPr/>
+        <p:nvPr/>
+      </p:nvGrpSpPr>
+      <p:grpSpPr>
+        <a:xfrm>
+          <a:off x="0" y="0"/>
+          <a:ext cx="0" cy="0"/>
+          <a:chOff x="0" y="0"/>
+          <a:chExt cx="0" cy="0"/>
+        </a:xfrm>
+      </p:grpSpPr>
+      <p:sp>
+        <p:nvSpPr>
+          <p:cNvPr id="2" name="Title 1">
+            <a:extLst>
+              <a:ext uri="{FF2B5EF4-FFF2-40B4-BE49-F238E27FC236}">
+                <a16:creationId xmlns:a16="http://schemas.microsoft.com/office/drawing/2014/main" id="{78CA0602-A5E8-48C4-AD47-27756C6FE72B}"/>
+              </a:ext>
+            </a:extLst>
+          </p:cNvPr>
+          <p:cNvSpPr>
+            <a:spLocks noGrp="1"/>
+          </p:cNvSpPr>
+          <p:nvPr>
+            <p:ph type="title"/>
+          </p:nvPr>
+        </p:nvSpPr>
+        <p:spPr>
+          <a:xfrm>
+            <a:off x="838200" y="365125"/>
+            <a:ext cx="10515600" cy="1325563"/>
+          </a:xfrm>
+        </p:spPr>
+        <p:txBody>
+          <a:bodyPr/>
+          <a:lstStyle/>
+          <a:p>
+            <a:r>
+              <a:rPr lang="en-US">
+                <a:cs typeface="Calibri Light"/>
+              </a:rPr>
+              <a:t>Limits of API Management</a:t>
+            </a:r>
+            <a:endParaRPr lang="en-US"/>
+          </a:p>
+        </p:txBody>
+      </p:sp>
+      <p:sp>
+        <p:nvSpPr>
+          <p:cNvPr id="3" name="Content Placeholder 2">
+            <a:extLst>
+              <a:ext uri="{FF2B5EF4-FFF2-40B4-BE49-F238E27FC236}">
+                <a16:creationId xmlns:a16="http://schemas.microsoft.com/office/drawing/2014/main" id="{2C4F5FAB-E5EC-4788-9D6C-411059988A66}"/>
+              </a:ext>
+            </a:extLst>
+          </p:cNvPr>
+          <p:cNvSpPr>
+            <a:spLocks noGrp="1"/>
+          </p:cNvSpPr>
+          <p:nvPr>
+            <p:ph idx="1"/>
+          </p:nvPr>
+        </p:nvSpPr>
+        <p:spPr>
+          <a:xfrm>
+            <a:off x="838200" y="1825625"/>
+            <a:ext cx="6551271" cy="4351338"/>
+          </a:xfrm>
+        </p:spPr>
+        <p:txBody>
+          <a:bodyPr vert="horz" lIns="91440" tIns="45720" rIns="91440" bIns="45720" rtlCol="0" anchor="t">
+            <a:normAutofit/>
+          </a:bodyPr>
+          <a:lstStyle/>
+          <a:p>
+            <a:pPr marL="0" indent="0">
+              <a:buNone/>
+            </a:pPr>
+            <a:r>
+              <a:rPr lang="en-US" dirty="0">
+                <a:cs typeface="Calibri"/>
+              </a:rPr>
+              <a:t>Avoid:</a:t>
+            </a:r>
+          </a:p>
+          <a:p>
+            <a:r>
+              <a:rPr lang="en-US" dirty="0">
+                <a:cs typeface="Calibri"/>
+              </a:rPr>
+              <a:t>Business Smart in Middle Ware</a:t>
+            </a:r>
+          </a:p>
+          <a:p>
+            <a:r>
+              <a:rPr lang="en-US" dirty="0">
+                <a:cs typeface="Calibri"/>
+              </a:rPr>
+              <a:t>Complex programming in unsuitable environments</a:t>
+            </a:r>
+          </a:p>
+          <a:p>
+            <a:r>
+              <a:rPr lang="en-US" dirty="0">
+                <a:cs typeface="Calibri"/>
+              </a:rPr>
+              <a:t>Designs which are difficult to test and deploy</a:t>
+            </a:r>
+          </a:p>
+        </p:txBody>
+      </p:sp>
+      <p:pic>
+        <p:nvPicPr>
+          <p:cNvPr id="4" name="Picture 4" descr="A close up of a logo&#10;&#10;Description generated with very high confidence">
+            <a:extLst>
+              <a:ext uri="{FF2B5EF4-FFF2-40B4-BE49-F238E27FC236}">
+                <a16:creationId xmlns:a16="http://schemas.microsoft.com/office/drawing/2014/main" id="{81E8A417-E551-456F-AEE0-05D6DC994040}"/>
+              </a:ext>
+            </a:extLst>
+          </p:cNvPr>
+          <p:cNvPicPr>
+            <a:picLocks noChangeAspect="1"/>
+          </p:cNvPicPr>
+          <p:nvPr/>
+        </p:nvPicPr>
+        <p:blipFill>
+          <a:blip r:embed="rId2"/>
+          <a:stretch>
+            <a:fillRect/>
+          </a:stretch>
+        </p:blipFill>
+        <p:spPr>
+          <a:xfrm>
+            <a:off x="7926730" y="1825648"/>
+            <a:ext cx="3428035" cy="3139185"/>
+          </a:xfrm>
+          <a:prstGeom prst="rect">
+            <a:avLst/>
+          </a:prstGeom>
+        </p:spPr>
+      </p:pic>
+      <p:sp>
+        <p:nvSpPr>
+          <p:cNvPr id="7" name="TextBox 1">
+            <a:extLst>
+              <a:ext uri="{FF2B5EF4-FFF2-40B4-BE49-F238E27FC236}">
+                <a16:creationId xmlns:a16="http://schemas.microsoft.com/office/drawing/2014/main" id="{E55A1FC0-8E30-4FAB-B566-BDFED0EBDD27}"/>
+              </a:ext>
+            </a:extLst>
+          </p:cNvPr>
+          <p:cNvSpPr txBox="1"/>
+          <p:nvPr/>
+        </p:nvSpPr>
+        <p:spPr>
+          <a:xfrm>
+            <a:off x="43543" y="6438899"/>
+            <a:ext cx="8068126" cy="369332"/>
+          </a:xfrm>
+          <a:prstGeom prst="rect">
+            <a:avLst/>
+          </a:prstGeom>
+          <a:noFill/>
+        </p:spPr>
+        <p:txBody>
+          <a:bodyPr rot="0" spcFirstLastPara="0" vert="horz" wrap="square" lIns="91440" tIns="45720" rIns="91440" bIns="45720" numCol="1" spcCol="0" rtlCol="0" fromWordArt="0" anchor="t" anchorCtr="0" forceAA="0" compatLnSpc="1">
+            <a:prstTxWarp prst="textNoShape">
+              <a:avLst/>
+            </a:prstTxWarp>
+            <a:spAutoFit/>
+          </a:bodyPr>
+          <a:lstStyle>
+            <a:defPPr>
+              <a:defRPr lang="en-US"/>
+            </a:defPPr>
+            <a:lvl1pPr marL="0" algn="l" defTabSz="914400" rtl="0" eaLnBrk="1" latinLnBrk="0" hangingPunct="1">
+              <a:defRPr sz="1800" kern="1200">
+                <a:solidFill>
+                  <a:schemeClr val="tx1"/>
+                </a:solidFill>
+                <a:latin typeface="+mn-lt"/>
+                <a:ea typeface="+mn-ea"/>
+                <a:cs typeface="+mn-cs"/>
+              </a:defRPr>
+            </a:lvl1pPr>
+            <a:lvl2pPr marL="457200" algn="l" defTabSz="914400" rtl="0" eaLnBrk="1" latinLnBrk="0" hangingPunct="1">
+              <a:defRPr sz="1800" kern="1200">
+                <a:solidFill>
+                  <a:schemeClr val="tx1"/>
+                </a:solidFill>
+                <a:latin typeface="+mn-lt"/>
+                <a:ea typeface="+mn-ea"/>
+                <a:cs typeface="+mn-cs"/>
+              </a:defRPr>
+            </a:lvl2pPr>
+            <a:lvl3pPr marL="914400" algn="l" defTabSz="914400" rtl="0" eaLnBrk="1" latinLnBrk="0" hangingPunct="1">
+              <a:defRPr sz="1800" kern="1200">
+                <a:solidFill>
+                  <a:schemeClr val="tx1"/>
+                </a:solidFill>
+                <a:latin typeface="+mn-lt"/>
+                <a:ea typeface="+mn-ea"/>
+                <a:cs typeface="+mn-cs"/>
+              </a:defRPr>
+            </a:lvl3pPr>
+            <a:lvl4pPr marL="1371600" algn="l" defTabSz="914400" rtl="0" eaLnBrk="1" latinLnBrk="0" hangingPunct="1">
+              <a:defRPr sz="1800" kern="1200">
+                <a:solidFill>
+                  <a:schemeClr val="tx1"/>
+                </a:solidFill>
+                <a:latin typeface="+mn-lt"/>
+                <a:ea typeface="+mn-ea"/>
+                <a:cs typeface="+mn-cs"/>
+              </a:defRPr>
+            </a:lvl4pPr>
+            <a:lvl5pPr marL="1828800" algn="l" defTabSz="914400" rtl="0" eaLnBrk="1" latinLnBrk="0" hangingPunct="1">
+              <a:defRPr sz="1800" kern="1200">
+                <a:solidFill>
+                  <a:schemeClr val="tx1"/>
+                </a:solidFill>
+                <a:latin typeface="+mn-lt"/>
+                <a:ea typeface="+mn-ea"/>
+                <a:cs typeface="+mn-cs"/>
+              </a:defRPr>
+            </a:lvl5pPr>
+            <a:lvl6pPr marL="2286000" algn="l" defTabSz="914400" rtl="0" eaLnBrk="1" latinLnBrk="0" hangingPunct="1">
+              <a:defRPr sz="1800" kern="1200">
+                <a:solidFill>
+                  <a:schemeClr val="tx1"/>
+                </a:solidFill>
+                <a:latin typeface="+mn-lt"/>
+                <a:ea typeface="+mn-ea"/>
+                <a:cs typeface="+mn-cs"/>
+              </a:defRPr>
+            </a:lvl6pPr>
+            <a:lvl7pPr marL="2743200" algn="l" defTabSz="914400" rtl="0" eaLnBrk="1" latinLnBrk="0" hangingPunct="1">
+              <a:defRPr sz="1800" kern="1200">
+                <a:solidFill>
+                  <a:schemeClr val="tx1"/>
+                </a:solidFill>
+                <a:latin typeface="+mn-lt"/>
+                <a:ea typeface="+mn-ea"/>
+                <a:cs typeface="+mn-cs"/>
+              </a:defRPr>
+            </a:lvl7pPr>
+            <a:lvl8pPr marL="3200400" algn="l" defTabSz="914400" rtl="0" eaLnBrk="1" latinLnBrk="0" hangingPunct="1">
+              <a:defRPr sz="1800" kern="1200">
+                <a:solidFill>
+                  <a:schemeClr val="tx1"/>
+                </a:solidFill>
+                <a:latin typeface="+mn-lt"/>
+                <a:ea typeface="+mn-ea"/>
+                <a:cs typeface="+mn-cs"/>
+              </a:defRPr>
+            </a:lvl8pPr>
+            <a:lvl9pPr marL="3657600" algn="l" defTabSz="914400" rtl="0" eaLnBrk="1" latinLnBrk="0" hangingPunct="1">
+              <a:defRPr sz="1800" kern="1200">
+                <a:solidFill>
+                  <a:schemeClr val="tx1"/>
+                </a:solidFill>
+                <a:latin typeface="+mn-lt"/>
+                <a:ea typeface="+mn-ea"/>
+                <a:cs typeface="+mn-cs"/>
+              </a:defRPr>
+            </a:lvl9pPr>
+          </a:lstStyle>
+          <a:p>
+            <a:r>
+              <a:rPr lang="en-US"/>
+              <a:t>Siehe: </a:t>
+            </a:r>
+            <a:r>
+              <a:rPr lang="en-US" dirty="0">
+                <a:ea typeface="+mn-lt"/>
+                <a:cs typeface="+mn-lt"/>
+                <a:hlinkClick r:id="rId3"/>
+              </a:rPr>
+              <a:t>https://www.thoughtworks.com/radar/platforms/overambitious-api-gateways</a:t>
+            </a:r>
+            <a:endParaRPr lang="en-US"/>
+          </a:p>
+        </p:txBody>
+      </p:sp>
+    </p:spTree>
+    <p:extLst>
+      <p:ext uri="{BB962C8B-B14F-4D97-AF65-F5344CB8AC3E}">
+        <p14:creationId xmlns:p14="http://schemas.microsoft.com/office/powerpoint/2010/main" val="3703846539"/>
       </p:ext>
     </p:extLst>
   </p:cSld>
@@ -4337,7 +5286,7 @@
           <p:cNvPr id="2" name="Title 1">
             <a:extLst>
               <a:ext uri="{FF2B5EF4-FFF2-40B4-BE49-F238E27FC236}">
-                <a16:creationId xmlns:a16="http://schemas.microsoft.com/office/drawing/2014/main" id="{A01B237F-DC68-4D18-B751-AFA75C879D73}"/>
+                <a16:creationId xmlns:a16="http://schemas.microsoft.com/office/drawing/2014/main" id="{496997CC-F4D4-4A42-89D8-A575E82CA66B}"/>
               </a:ext>
             </a:extLst>
           </p:cNvPr>
@@ -4354,49 +5303,420 @@
           <a:lstStyle/>
           <a:p>
             <a:r>
-              <a:rPr lang="de-AT" dirty="0"/>
-              <a:t>Das Welt vor </a:t>
-            </a:r>
-            <a:r>
-              <a:rPr lang="de-AT" dirty="0" err="1"/>
-              <a:t>Api</a:t>
-            </a:r>
-            <a:r>
-              <a:rPr lang="de-AT" dirty="0"/>
-              <a:t> Management</a:t>
-            </a:r>
-          </a:p>
-        </p:txBody>
-      </p:sp>
-      <p:sp>
-        <p:nvSpPr>
-          <p:cNvPr id="3" name="Content Placeholder 2">
-            <a:extLst>
-              <a:ext uri="{FF2B5EF4-FFF2-40B4-BE49-F238E27FC236}">
-                <a16:creationId xmlns:a16="http://schemas.microsoft.com/office/drawing/2014/main" id="{50B71FC1-069B-47E9-A06D-E1A4CBBCED19}"/>
-              </a:ext>
-            </a:extLst>
-          </p:cNvPr>
-          <p:cNvSpPr>
-            <a:spLocks noGrp="1"/>
-          </p:cNvSpPr>
-          <p:nvPr>
-            <p:ph idx="1"/>
-          </p:nvPr>
-        </p:nvSpPr>
-        <p:spPr/>
-        <p:txBody>
-          <a:bodyPr/>
+              <a:rPr lang="en-US">
+                <a:cs typeface="Calibri Light"/>
+              </a:rPr>
+              <a:t>API What?</a:t>
+            </a:r>
+            <a:endParaRPr lang="en-US"/>
+          </a:p>
+        </p:txBody>
+      </p:sp>
+      <p:sp>
+        <p:nvSpPr>
+          <p:cNvPr id="4" name="TextBox 3">
+            <a:extLst>
+              <a:ext uri="{FF2B5EF4-FFF2-40B4-BE49-F238E27FC236}">
+                <a16:creationId xmlns:a16="http://schemas.microsoft.com/office/drawing/2014/main" id="{7E64672D-62E5-4AE9-8236-B4BF25202FFF}"/>
+              </a:ext>
+            </a:extLst>
+          </p:cNvPr>
+          <p:cNvSpPr txBox="1"/>
+          <p:nvPr/>
+        </p:nvSpPr>
+        <p:spPr>
+          <a:xfrm>
+            <a:off x="4787900" y="1685471"/>
+            <a:ext cx="6154056" cy="2308324"/>
+          </a:xfrm>
+          <a:prstGeom prst="rect">
+            <a:avLst/>
+          </a:prstGeom>
+          <a:noFill/>
+        </p:spPr>
+        <p:txBody>
+          <a:bodyPr rot="0" spcFirstLastPara="0" vertOverflow="overflow" horzOverflow="overflow" vert="horz" wrap="square" lIns="91440" tIns="45720" rIns="91440" bIns="45720" numCol="1" spcCol="0" rtlCol="0" fromWordArt="0" anchor="t" anchorCtr="0" forceAA="0" compatLnSpc="1">
+            <a:prstTxWarp prst="textNoShape">
+              <a:avLst/>
+            </a:prstTxWarp>
+            <a:spAutoFit/>
+          </a:bodyPr>
           <a:lstStyle/>
           <a:p>
-            <a:endParaRPr lang="de-AT"/>
-          </a:p>
-        </p:txBody>
-      </p:sp>
+            <a:r>
+              <a:rPr lang="en-US">
+                <a:solidFill>
+                  <a:srgbClr val="0000FF"/>
+                </a:solidFill>
+                <a:latin typeface="Fira Code"/>
+              </a:rPr>
+              <a:t>public</a:t>
+            </a:r>
+            <a:r>
+              <a:rPr lang="en-US" dirty="0">
+                <a:latin typeface="Fira Code"/>
+              </a:rPr>
+              <a:t> </a:t>
+            </a:r>
+            <a:r>
+              <a:rPr lang="en-US">
+                <a:solidFill>
+                  <a:srgbClr val="0000FF"/>
+                </a:solidFill>
+                <a:latin typeface="Fira Code"/>
+              </a:rPr>
+              <a:t>interface</a:t>
+            </a:r>
+            <a:r>
+              <a:rPr lang="en-US" dirty="0">
+                <a:latin typeface="Fira Code"/>
+              </a:rPr>
+              <a:t> </a:t>
+            </a:r>
+            <a:r>
+              <a:rPr lang="en-US">
+                <a:solidFill>
+                  <a:srgbClr val="267F99"/>
+                </a:solidFill>
+                <a:latin typeface="Fira Code"/>
+              </a:rPr>
+              <a:t>Calculator</a:t>
+            </a:r>
+          </a:p>
+          <a:p>
+            <a:r>
+              <a:rPr lang="en-US">
+                <a:latin typeface="Fira Code"/>
+              </a:rPr>
+              <a:t>{</a:t>
+            </a:r>
+          </a:p>
+          <a:p>
+            <a:r>
+              <a:rPr lang="en-US">
+                <a:solidFill>
+                  <a:srgbClr val="0000FF"/>
+                </a:solidFill>
+                <a:latin typeface="Fira Code"/>
+              </a:rPr>
+              <a:t>  int</a:t>
+            </a:r>
+            <a:r>
+              <a:rPr lang="en-US" dirty="0">
+                <a:latin typeface="Fira Code"/>
+              </a:rPr>
+              <a:t> </a:t>
+            </a:r>
+            <a:r>
+              <a:rPr lang="en-US">
+                <a:solidFill>
+                  <a:srgbClr val="795E26"/>
+                </a:solidFill>
+                <a:latin typeface="Fira Code"/>
+              </a:rPr>
+              <a:t>Add</a:t>
+            </a:r>
+            <a:r>
+              <a:rPr lang="en-US">
+                <a:latin typeface="Fira Code"/>
+              </a:rPr>
+              <a:t>(</a:t>
+            </a:r>
+            <a:r>
+              <a:rPr lang="en-US">
+                <a:solidFill>
+                  <a:srgbClr val="0000FF"/>
+                </a:solidFill>
+                <a:latin typeface="Fira Code"/>
+              </a:rPr>
+              <a:t>int</a:t>
+            </a:r>
+            <a:r>
+              <a:rPr lang="en-US" dirty="0">
+                <a:latin typeface="Fira Code"/>
+              </a:rPr>
+              <a:t> </a:t>
+            </a:r>
+            <a:r>
+              <a:rPr lang="en-US">
+                <a:solidFill>
+                  <a:srgbClr val="001080"/>
+                </a:solidFill>
+                <a:latin typeface="Fira Code"/>
+              </a:rPr>
+              <a:t>summand1</a:t>
+            </a:r>
+            <a:r>
+              <a:rPr lang="en-US">
+                <a:latin typeface="Fira Code"/>
+              </a:rPr>
+              <a:t>, </a:t>
+            </a:r>
+            <a:r>
+              <a:rPr lang="en-US">
+                <a:solidFill>
+                  <a:srgbClr val="0000FF"/>
+                </a:solidFill>
+                <a:latin typeface="Fira Code"/>
+              </a:rPr>
+              <a:t>int</a:t>
+            </a:r>
+            <a:r>
+              <a:rPr lang="en-US" dirty="0">
+                <a:latin typeface="Fira Code"/>
+              </a:rPr>
+              <a:t> </a:t>
+            </a:r>
+            <a:r>
+              <a:rPr lang="en-US">
+                <a:solidFill>
+                  <a:srgbClr val="001080"/>
+                </a:solidFill>
+                <a:latin typeface="Fira Code"/>
+              </a:rPr>
+              <a:t>summand2</a:t>
+            </a:r>
+            <a:r>
+              <a:rPr lang="en-US">
+                <a:latin typeface="Fira Code"/>
+              </a:rPr>
+              <a:t>);</a:t>
+            </a:r>
+          </a:p>
+          <a:p>
+            <a:br>
+              <a:rPr lang="en-US" dirty="0">
+                <a:latin typeface="Fira Code"/>
+              </a:rPr>
+            </a:br>
+            <a:r>
+              <a:rPr lang="en-US">
+                <a:solidFill>
+                  <a:srgbClr val="0000FF"/>
+                </a:solidFill>
+                <a:latin typeface="Fira Code"/>
+              </a:rPr>
+              <a:t>  int</a:t>
+            </a:r>
+            <a:r>
+              <a:rPr lang="en-US" dirty="0">
+                <a:latin typeface="Fira Code"/>
+              </a:rPr>
+              <a:t> </a:t>
+            </a:r>
+            <a:r>
+              <a:rPr lang="en-US">
+                <a:solidFill>
+                  <a:srgbClr val="795E26"/>
+                </a:solidFill>
+                <a:latin typeface="Fira Code"/>
+              </a:rPr>
+              <a:t>Sub</a:t>
+            </a:r>
+            <a:r>
+              <a:rPr lang="en-US">
+                <a:latin typeface="Fira Code"/>
+              </a:rPr>
+              <a:t>(</a:t>
+            </a:r>
+            <a:r>
+              <a:rPr lang="en-US">
+                <a:solidFill>
+                  <a:srgbClr val="0000FF"/>
+                </a:solidFill>
+                <a:latin typeface="Fira Code"/>
+              </a:rPr>
+              <a:t>int</a:t>
+            </a:r>
+            <a:r>
+              <a:rPr lang="en-US" dirty="0">
+                <a:latin typeface="Fira Code"/>
+              </a:rPr>
+              <a:t> </a:t>
+            </a:r>
+            <a:r>
+              <a:rPr lang="en-US">
+                <a:solidFill>
+                  <a:srgbClr val="001080"/>
+                </a:solidFill>
+                <a:latin typeface="Fira Code"/>
+              </a:rPr>
+              <a:t>minuend</a:t>
+            </a:r>
+            <a:r>
+              <a:rPr lang="en-US">
+                <a:latin typeface="Fira Code"/>
+              </a:rPr>
+              <a:t>, </a:t>
+            </a:r>
+            <a:r>
+              <a:rPr lang="en-US">
+                <a:solidFill>
+                  <a:srgbClr val="0000FF"/>
+                </a:solidFill>
+                <a:latin typeface="Fira Code"/>
+              </a:rPr>
+              <a:t>int</a:t>
+            </a:r>
+            <a:r>
+              <a:rPr lang="en-US" dirty="0">
+                <a:latin typeface="Fira Code"/>
+              </a:rPr>
+              <a:t> </a:t>
+            </a:r>
+            <a:r>
+              <a:rPr lang="en-US">
+                <a:solidFill>
+                  <a:srgbClr val="001080"/>
+                </a:solidFill>
+                <a:latin typeface="Fira Code"/>
+              </a:rPr>
+              <a:t>subtrahend</a:t>
+            </a:r>
+            <a:r>
+              <a:rPr lang="en-US" dirty="0">
+                <a:latin typeface="Fira Code"/>
+              </a:rPr>
+              <a:t>);</a:t>
+            </a:r>
+          </a:p>
+          <a:p>
+            <a:r>
+              <a:rPr lang="en-US">
+                <a:latin typeface="Fira Code"/>
+              </a:rPr>
+              <a:t>}</a:t>
+            </a:r>
+          </a:p>
+          <a:p>
+            <a:endParaRPr lang="en-US">
+              <a:latin typeface="Fira Code"/>
+            </a:endParaRPr>
+          </a:p>
+          <a:p>
+            <a:endParaRPr lang="en-US">
+              <a:latin typeface="Fira Code"/>
+            </a:endParaRPr>
+          </a:p>
+        </p:txBody>
+      </p:sp>
+      <p:sp>
+        <p:nvSpPr>
+          <p:cNvPr id="6" name="TextBox 5">
+            <a:extLst>
+              <a:ext uri="{FF2B5EF4-FFF2-40B4-BE49-F238E27FC236}">
+                <a16:creationId xmlns:a16="http://schemas.microsoft.com/office/drawing/2014/main" id="{820AAD51-16A6-4C4A-B8DA-3700F4264227}"/>
+              </a:ext>
+            </a:extLst>
+          </p:cNvPr>
+          <p:cNvSpPr txBox="1"/>
+          <p:nvPr/>
+        </p:nvSpPr>
+        <p:spPr>
+          <a:xfrm>
+            <a:off x="841828" y="1685471"/>
+            <a:ext cx="3614056" cy="954107"/>
+          </a:xfrm>
+          <a:prstGeom prst="rect">
+            <a:avLst/>
+          </a:prstGeom>
+          <a:noFill/>
+        </p:spPr>
+        <p:txBody>
+          <a:bodyPr rot="0" spcFirstLastPara="0" vertOverflow="overflow" horzOverflow="overflow" vert="horz" wrap="square" lIns="91440" tIns="45720" rIns="91440" bIns="45720" numCol="1" spcCol="0" rtlCol="0" fromWordArt="0" anchor="t" anchorCtr="0" forceAA="0" compatLnSpc="1">
+            <a:prstTxWarp prst="textNoShape">
+              <a:avLst/>
+            </a:prstTxWarp>
+            <a:spAutoFit/>
+          </a:bodyPr>
+          <a:lstStyle/>
+          <a:p>
+            <a:r>
+              <a:rPr lang="en-US" sz="2800">
+                <a:cs typeface="Calibri"/>
+              </a:rPr>
+              <a:t>Interface inside a component</a:t>
+            </a:r>
+            <a:endParaRPr lang="en-US" sz="2800" dirty="0">
+              <a:cs typeface="Calibri"/>
+            </a:endParaRPr>
+          </a:p>
+        </p:txBody>
+      </p:sp>
+      <p:sp>
+        <p:nvSpPr>
+          <p:cNvPr id="9" name="TextBox 8">
+            <a:extLst>
+              <a:ext uri="{FF2B5EF4-FFF2-40B4-BE49-F238E27FC236}">
+                <a16:creationId xmlns:a16="http://schemas.microsoft.com/office/drawing/2014/main" id="{19BE1F02-5E9A-4165-AC1B-BF3615E70BAC}"/>
+              </a:ext>
+            </a:extLst>
+          </p:cNvPr>
+          <p:cNvSpPr txBox="1"/>
+          <p:nvPr/>
+        </p:nvSpPr>
+        <p:spPr>
+          <a:xfrm>
+            <a:off x="841827" y="3672113"/>
+            <a:ext cx="3614056" cy="954107"/>
+          </a:xfrm>
+          <a:prstGeom prst="rect">
+            <a:avLst/>
+          </a:prstGeom>
+          <a:noFill/>
+        </p:spPr>
+        <p:txBody>
+          <a:bodyPr rot="0" spcFirstLastPara="0" vertOverflow="overflow" horzOverflow="overflow" vert="horz" wrap="square" lIns="91440" tIns="45720" rIns="91440" bIns="45720" numCol="1" spcCol="0" rtlCol="0" fromWordArt="0" anchor="t" anchorCtr="0" forceAA="0" compatLnSpc="1">
+            <a:prstTxWarp prst="textNoShape">
+              <a:avLst/>
+            </a:prstTxWarp>
+            <a:spAutoFit/>
+          </a:bodyPr>
+          <a:lstStyle/>
+          <a:p>
+            <a:r>
+              <a:rPr lang="en-US" sz="2800">
+                <a:cs typeface="Calibri"/>
+              </a:rPr>
+              <a:t>Interface provided by a component</a:t>
+            </a:r>
+          </a:p>
+        </p:txBody>
+      </p:sp>
+      <p:pic>
+        <p:nvPicPr>
+          <p:cNvPr id="12" name="Picture 12" descr="A screenshot of a cell phone&#10;&#10;Description generated with very high confidence">
+            <a:extLst>
+              <a:ext uri="{FF2B5EF4-FFF2-40B4-BE49-F238E27FC236}">
+                <a16:creationId xmlns:a16="http://schemas.microsoft.com/office/drawing/2014/main" id="{31F731F9-9944-4909-842F-A59649C80FB2}"/>
+              </a:ext>
+            </a:extLst>
+          </p:cNvPr>
+          <p:cNvPicPr>
+            <a:picLocks noChangeAspect="1"/>
+          </p:cNvPicPr>
+          <p:nvPr/>
+        </p:nvPicPr>
+        <p:blipFill>
+          <a:blip r:embed="rId2"/>
+          <a:stretch>
+            <a:fillRect/>
+          </a:stretch>
+        </p:blipFill>
+        <p:spPr>
+          <a:xfrm>
+            <a:off x="4787900" y="3668725"/>
+            <a:ext cx="5528128" cy="2849765"/>
+          </a:xfrm>
+          <a:prstGeom prst="rect">
+            <a:avLst/>
+          </a:prstGeom>
+        </p:spPr>
+      </p:pic>
     </p:spTree>
     <p:extLst>
       <p:ext uri="{BB962C8B-B14F-4D97-AF65-F5344CB8AC3E}">
-        <p14:creationId xmlns:p14="http://schemas.microsoft.com/office/powerpoint/2010/main" val="1011410958"/>
+        <p14:creationId xmlns:p14="http://schemas.microsoft.com/office/powerpoint/2010/main" val="2111328435"/>
       </p:ext>
     </p:extLst>
   </p:cSld>
@@ -4428,7 +5748,7 @@
           <p:cNvPr id="2" name="Title 1">
             <a:extLst>
               <a:ext uri="{FF2B5EF4-FFF2-40B4-BE49-F238E27FC236}">
-                <a16:creationId xmlns:a16="http://schemas.microsoft.com/office/drawing/2014/main" id="{F861A869-D6EE-4E94-B083-53C1C30E44A7}"/>
+                <a16:creationId xmlns:a16="http://schemas.microsoft.com/office/drawing/2014/main" id="{024676C4-619A-4D81-BCA0-64E74755F1F8}"/>
               </a:ext>
             </a:extLst>
           </p:cNvPr>
@@ -4445,6 +5765,221 @@
           <a:lstStyle/>
           <a:p>
             <a:r>
+              <a:rPr lang="en-US">
+                <a:cs typeface="Calibri Light"/>
+              </a:rPr>
+              <a:t>History by Example</a:t>
+            </a:r>
+            <a:endParaRPr lang="en-US"/>
+          </a:p>
+        </p:txBody>
+      </p:sp>
+      <p:pic>
+        <p:nvPicPr>
+          <p:cNvPr id="3" name="Picture 3" descr="A screenshot of a cell phone&#10;&#10;Description generated with very high confidence">
+            <a:extLst>
+              <a:ext uri="{FF2B5EF4-FFF2-40B4-BE49-F238E27FC236}">
+                <a16:creationId xmlns:a16="http://schemas.microsoft.com/office/drawing/2014/main" id="{459106F1-3E60-4E4C-96E0-0A4A3D3BC141}"/>
+              </a:ext>
+            </a:extLst>
+          </p:cNvPr>
+          <p:cNvPicPr>
+            <a:picLocks noChangeAspect="1"/>
+          </p:cNvPicPr>
+          <p:nvPr/>
+        </p:nvPicPr>
+        <p:blipFill>
+          <a:blip r:embed="rId2"/>
+          <a:stretch>
+            <a:fillRect/>
+          </a:stretch>
+        </p:blipFill>
+        <p:spPr>
+          <a:xfrm>
+            <a:off x="4630366" y="1826169"/>
+            <a:ext cx="5858019" cy="4022088"/>
+          </a:xfrm>
+          <a:prstGeom prst="rect">
+            <a:avLst/>
+          </a:prstGeom>
+        </p:spPr>
+      </p:pic>
+      <p:sp>
+        <p:nvSpPr>
+          <p:cNvPr id="6" name="TextBox 5">
+            <a:extLst>
+              <a:ext uri="{FF2B5EF4-FFF2-40B4-BE49-F238E27FC236}">
+                <a16:creationId xmlns:a16="http://schemas.microsoft.com/office/drawing/2014/main" id="{4E60518B-4573-48BA-8E8B-1CC5387AC1BF}"/>
+              </a:ext>
+            </a:extLst>
+          </p:cNvPr>
+          <p:cNvSpPr txBox="1"/>
+          <p:nvPr/>
+        </p:nvSpPr>
+        <p:spPr>
+          <a:xfrm>
+            <a:off x="43543" y="6438899"/>
+            <a:ext cx="6934198" cy="369332"/>
+          </a:xfrm>
+          <a:prstGeom prst="rect">
+            <a:avLst/>
+          </a:prstGeom>
+          <a:noFill/>
+        </p:spPr>
+        <p:txBody>
+          <a:bodyPr rot="0" spcFirstLastPara="0" vertOverflow="overflow" horzOverflow="overflow" vert="horz" wrap="square" lIns="91440" tIns="45720" rIns="91440" bIns="45720" numCol="1" spcCol="0" rtlCol="0" fromWordArt="0" anchor="t" anchorCtr="0" forceAA="0" compatLnSpc="1">
+            <a:prstTxWarp prst="textNoShape">
+              <a:avLst/>
+            </a:prstTxWarp>
+            <a:spAutoFit/>
+          </a:bodyPr>
+          <a:lstStyle/>
+          <a:p>
+            <a:r>
+              <a:rPr lang="en-US"/>
+              <a:t>Quelle: </a:t>
+            </a:r>
+            <a:r>
+              <a:rPr lang="en-US" dirty="0">
+                <a:ea typeface="+mn-lt"/>
+                <a:cs typeface="+mn-lt"/>
+                <a:hlinkClick r:id="rId3"/>
+              </a:rPr>
+              <a:t>https://dzone.com/articles/the-evolution-of-systems-integration</a:t>
+            </a:r>
+            <a:endParaRPr lang="en-US"/>
+          </a:p>
+        </p:txBody>
+      </p:sp>
+      <p:sp>
+        <p:nvSpPr>
+          <p:cNvPr id="7" name="TextBox 6">
+            <a:extLst>
+              <a:ext uri="{FF2B5EF4-FFF2-40B4-BE49-F238E27FC236}">
+                <a16:creationId xmlns:a16="http://schemas.microsoft.com/office/drawing/2014/main" id="{DADDBFF6-BFE3-4650-AE9B-C64E53C1CEB2}"/>
+              </a:ext>
+            </a:extLst>
+          </p:cNvPr>
+          <p:cNvSpPr txBox="1"/>
+          <p:nvPr/>
+        </p:nvSpPr>
+        <p:spPr>
+          <a:xfrm>
+            <a:off x="841828" y="1984828"/>
+            <a:ext cx="3614056" cy="1815882"/>
+          </a:xfrm>
+          <a:prstGeom prst="rect">
+            <a:avLst/>
+          </a:prstGeom>
+          <a:noFill/>
+        </p:spPr>
+        <p:txBody>
+          <a:bodyPr rot="0" spcFirstLastPara="0" vertOverflow="overflow" horzOverflow="overflow" vert="horz" wrap="square" lIns="91440" tIns="45720" rIns="91440" bIns="45720" numCol="1" spcCol="0" rtlCol="0" fromWordArt="0" anchor="t" anchorCtr="0" forceAA="0" compatLnSpc="1">
+            <a:prstTxWarp prst="textNoShape">
+              <a:avLst/>
+            </a:prstTxWarp>
+            <a:spAutoFit/>
+          </a:bodyPr>
+          <a:lstStyle/>
+          <a:p>
+            <a:r>
+              <a:rPr lang="en-US" sz="2800"/>
+              <a:t>Pattern used by e.g.</a:t>
+            </a:r>
+            <a:endParaRPr lang="en-US" sz="2800">
+              <a:cs typeface="Calibri"/>
+            </a:endParaRPr>
+          </a:p>
+          <a:p>
+            <a:pPr marL="457200" indent="-457200">
+              <a:buFont typeface="Arial"/>
+              <a:buChar char="•"/>
+            </a:pPr>
+            <a:r>
+              <a:rPr lang="en-US" sz="2800">
+                <a:cs typeface="Calibri"/>
+              </a:rPr>
+              <a:t>RPC</a:t>
+            </a:r>
+          </a:p>
+          <a:p>
+            <a:pPr marL="457200" indent="-457200">
+              <a:buFont typeface="Arial"/>
+              <a:buChar char="•"/>
+            </a:pPr>
+            <a:r>
+              <a:rPr lang="en-US" sz="2800">
+                <a:cs typeface="Calibri"/>
+              </a:rPr>
+              <a:t>CORBA</a:t>
+            </a:r>
+          </a:p>
+          <a:p>
+            <a:pPr marL="457200" indent="-457200">
+              <a:buFont typeface="Arial"/>
+              <a:buChar char="•"/>
+            </a:pPr>
+            <a:r>
+              <a:rPr lang="en-US" sz="2800">
+                <a:cs typeface="Calibri"/>
+              </a:rPr>
+              <a:t>Java RMI</a:t>
+            </a:r>
+          </a:p>
+        </p:txBody>
+      </p:sp>
+    </p:spTree>
+    <p:extLst>
+      <p:ext uri="{BB962C8B-B14F-4D97-AF65-F5344CB8AC3E}">
+        <p14:creationId xmlns:p14="http://schemas.microsoft.com/office/powerpoint/2010/main" val="1704287799"/>
+      </p:ext>
+    </p:extLst>
+  </p:cSld>
+  <p:clrMapOvr>
+    <a:masterClrMapping/>
+  </p:clrMapOvr>
+</p:sld>
+</file>
+
+<file path=ppt/slides/slide5.xml><?xml version="1.0" encoding="utf-8"?>
+<p:sld xmlns:a="http://schemas.openxmlformats.org/drawingml/2006/main" xmlns:r="http://schemas.openxmlformats.org/officeDocument/2006/relationships" xmlns:p="http://schemas.openxmlformats.org/presentationml/2006/main">
+  <p:cSld>
+    <p:spTree>
+      <p:nvGrpSpPr>
+        <p:cNvPr id="1" name=""/>
+        <p:cNvGrpSpPr/>
+        <p:nvPr/>
+      </p:nvGrpSpPr>
+      <p:grpSpPr>
+        <a:xfrm>
+          <a:off x="0" y="0"/>
+          <a:ext cx="0" cy="0"/>
+          <a:chOff x="0" y="0"/>
+          <a:chExt cx="0" cy="0"/>
+        </a:xfrm>
+      </p:grpSpPr>
+      <p:sp>
+        <p:nvSpPr>
+          <p:cNvPr id="2" name="Title 1">
+            <a:extLst>
+              <a:ext uri="{FF2B5EF4-FFF2-40B4-BE49-F238E27FC236}">
+                <a16:creationId xmlns:a16="http://schemas.microsoft.com/office/drawing/2014/main" id="{F861A869-D6EE-4E94-B083-53C1C30E44A7}"/>
+              </a:ext>
+            </a:extLst>
+          </p:cNvPr>
+          <p:cNvSpPr>
+            <a:spLocks noGrp="1"/>
+          </p:cNvSpPr>
+          <p:nvPr>
+            <p:ph type="title"/>
+          </p:nvPr>
+        </p:nvSpPr>
+        <p:spPr/>
+        <p:txBody>
+          <a:bodyPr/>
+          <a:lstStyle/>
+          <a:p>
+            <a:r>
               <a:rPr lang="de-AT" dirty="0"/>
               <a:t>Wie funktioniert API Management</a:t>
             </a:r>
@@ -4465,7 +6000,7 @@
         </p:nvSpPr>
         <p:spPr>
           <a:xfrm>
-            <a:off x="5020353" y="4549228"/>
+            <a:off x="5021974" y="4987216"/>
             <a:ext cx="2533066" cy="461665"/>
           </a:xfrm>
           <a:prstGeom prst="rect">
@@ -4508,16 +6043,14 @@
           <p:nvPr/>
         </p:nvPicPr>
         <p:blipFill>
-          <a:blip r:embed="rId2">
-            <a:extLst/>
-          </a:blip>
+          <a:blip r:embed="rId2"/>
           <a:stretch>
             <a:fillRect/>
           </a:stretch>
         </p:blipFill>
         <p:spPr>
           <a:xfrm>
-            <a:off x="9874963" y="2025577"/>
+            <a:off x="10112441" y="2209565"/>
             <a:ext cx="780290" cy="780290"/>
           </a:xfrm>
           <a:prstGeom prst="rect">
@@ -4539,7 +6072,7 @@
         </p:nvSpPr>
         <p:spPr>
           <a:xfrm>
-            <a:off x="1369689" y="4549228"/>
+            <a:off x="1452953" y="4987216"/>
             <a:ext cx="1731564" cy="461665"/>
           </a:xfrm>
           <a:prstGeom prst="rect">
@@ -4581,7 +6114,7 @@
         </p:nvCxnSpPr>
         <p:spPr>
           <a:xfrm>
-            <a:off x="3216438" y="3199978"/>
+            <a:off x="3281559" y="3402109"/>
             <a:ext cx="1620000" cy="0"/>
           </a:xfrm>
           <a:prstGeom prst="straightConnector1">
@@ -4624,7 +6157,7 @@
         </p:nvCxnSpPr>
         <p:spPr>
           <a:xfrm>
-            <a:off x="7798075" y="3199978"/>
+            <a:off x="7935768" y="3402109"/>
             <a:ext cx="1620000" cy="0"/>
           </a:xfrm>
           <a:prstGeom prst="straightConnector1">
@@ -4667,7 +6200,7 @@
         </p:nvSpPr>
         <p:spPr>
           <a:xfrm>
-            <a:off x="9708400" y="2759450"/>
+            <a:off x="9927735" y="3061367"/>
             <a:ext cx="1151918" cy="307777"/>
           </a:xfrm>
           <a:prstGeom prst="rect">
@@ -4717,7 +6250,7 @@
         </p:blipFill>
         <p:spPr>
           <a:xfrm>
-            <a:off x="5232585" y="2284114"/>
+            <a:off x="5234206" y="2341102"/>
             <a:ext cx="2108602" cy="2108602"/>
           </a:xfrm>
           <a:prstGeom prst="rect">
@@ -4755,7 +6288,7 @@
         </p:blipFill>
         <p:spPr>
           <a:xfrm>
-            <a:off x="1688066" y="2679978"/>
+            <a:off x="1771330" y="2854894"/>
             <a:ext cx="1094811" cy="1094811"/>
           </a:xfrm>
           <a:prstGeom prst="rect">
@@ -4782,16 +6315,14 @@
           <p:nvPr/>
         </p:nvPicPr>
         <p:blipFill>
-          <a:blip r:embed="rId2">
-            <a:extLst/>
-          </a:blip>
+          <a:blip r:embed="rId2"/>
           <a:stretch>
             <a:fillRect/>
           </a:stretch>
         </p:blipFill>
         <p:spPr>
           <a:xfrm>
-            <a:off x="9874963" y="3307450"/>
+            <a:off x="10112441" y="3899652"/>
             <a:ext cx="780290" cy="780290"/>
           </a:xfrm>
           <a:prstGeom prst="rect">
@@ -4813,7 +6344,7 @@
         </p:nvSpPr>
         <p:spPr>
           <a:xfrm>
-            <a:off x="9615682" y="4084939"/>
+            <a:off x="9835017" y="4722499"/>
             <a:ext cx="1337354" cy="307777"/>
           </a:xfrm>
           <a:prstGeom prst="rect">
@@ -4854,7 +6385,7 @@
 </p:sld>
 </file>
 
-<file path=ppt/slides/slide5.xml><?xml version="1.0" encoding="utf-8"?>
+<file path=ppt/slides/slide6.xml><?xml version="1.0" encoding="utf-8"?>
 <p:sld xmlns:a="http://schemas.openxmlformats.org/drawingml/2006/main" xmlns:r="http://schemas.openxmlformats.org/officeDocument/2006/relationships" xmlns:p="http://schemas.openxmlformats.org/presentationml/2006/main">
   <p:cSld>
     <p:spTree>
@@ -4876,7 +6407,7 @@
           <p:cNvPr id="2" name="Title 1">
             <a:extLst>
               <a:ext uri="{FF2B5EF4-FFF2-40B4-BE49-F238E27FC236}">
-                <a16:creationId xmlns:a16="http://schemas.microsoft.com/office/drawing/2014/main" id="{7C912831-7D34-40E6-B263-4279128B1ED2}"/>
+                <a16:creationId xmlns:a16="http://schemas.microsoft.com/office/drawing/2014/main" id="{D851CCC7-3AFD-4D34-A74C-1C7BD78DE398}"/>
               </a:ext>
             </a:extLst>
           </p:cNvPr>
@@ -4893,6 +6424,288 @@
           <a:lstStyle/>
           <a:p>
             <a:r>
+              <a:rPr lang="en-US" dirty="0">
+                <a:cs typeface="Calibri Light"/>
+              </a:rPr>
+              <a:t>Wann API Management</a:t>
+            </a:r>
+            <a:endParaRPr lang="en-US" dirty="0" err="1"/>
+          </a:p>
+        </p:txBody>
+      </p:sp>
+      <p:pic>
+        <p:nvPicPr>
+          <p:cNvPr id="18" name="Picture 18" descr="A screenshot of a cell phone&#10;&#10;Description generated with very high confidence">
+            <a:extLst>
+              <a:ext uri="{FF2B5EF4-FFF2-40B4-BE49-F238E27FC236}">
+                <a16:creationId xmlns:a16="http://schemas.microsoft.com/office/drawing/2014/main" id="{D030A37E-9C1F-4E75-9ECE-6411C99E5A0F}"/>
+              </a:ext>
+            </a:extLst>
+          </p:cNvPr>
+          <p:cNvPicPr>
+            <a:picLocks noGrp="1" noChangeAspect="1"/>
+          </p:cNvPicPr>
+          <p:nvPr>
+            <p:ph idx="1"/>
+          </p:nvPr>
+        </p:nvPicPr>
+        <p:blipFill>
+          <a:blip r:embed="rId2"/>
+          <a:stretch>
+            <a:fillRect/>
+          </a:stretch>
+        </p:blipFill>
+        <p:spPr>
+          <a:xfrm>
+            <a:off x="679470" y="2236456"/>
+            <a:ext cx="10823414" cy="2786966"/>
+          </a:xfrm>
+          <a:prstGeom prst="rect">
+            <a:avLst/>
+          </a:prstGeom>
+        </p:spPr>
+      </p:pic>
+      <p:sp>
+        <p:nvSpPr>
+          <p:cNvPr id="21" name="TextBox 20">
+            <a:extLst>
+              <a:ext uri="{FF2B5EF4-FFF2-40B4-BE49-F238E27FC236}">
+                <a16:creationId xmlns:a16="http://schemas.microsoft.com/office/drawing/2014/main" id="{5552AD80-07BC-4498-AFF7-F455F2EC2534}"/>
+              </a:ext>
+            </a:extLst>
+          </p:cNvPr>
+          <p:cNvSpPr txBox="1"/>
+          <p:nvPr/>
+        </p:nvSpPr>
+        <p:spPr>
+          <a:xfrm>
+            <a:off x="43543" y="6438899"/>
+            <a:ext cx="6934198" cy="369332"/>
+          </a:xfrm>
+          <a:prstGeom prst="rect">
+            <a:avLst/>
+          </a:prstGeom>
+          <a:noFill/>
+        </p:spPr>
+        <p:txBody>
+          <a:bodyPr rot="0" spcFirstLastPara="0" vertOverflow="overflow" horzOverflow="overflow" vert="horz" wrap="square" lIns="91440" tIns="45720" rIns="91440" bIns="45720" numCol="1" spcCol="0" rtlCol="0" fromWordArt="0" anchor="t" anchorCtr="0" forceAA="0" compatLnSpc="1">
+            <a:prstTxWarp prst="textNoShape">
+              <a:avLst/>
+            </a:prstTxWarp>
+            <a:spAutoFit/>
+          </a:bodyPr>
+          <a:lstStyle/>
+          <a:p>
+            <a:r>
+              <a:rPr lang="en-US" dirty="0"/>
+              <a:t>Quelle: </a:t>
+            </a:r>
+            <a:r>
+              <a:rPr lang="en-US" dirty="0">
+                <a:ea typeface="+mn-lt"/>
+                <a:cs typeface="+mn-lt"/>
+                <a:hlinkClick r:id="rId3"/>
+              </a:rPr>
+              <a:t>https://dzone.com/articles/api-gateway-vs-service-mesh</a:t>
+            </a:r>
+            <a:endParaRPr lang="en-US"/>
+          </a:p>
+        </p:txBody>
+      </p:sp>
+    </p:spTree>
+    <p:extLst>
+      <p:ext uri="{BB962C8B-B14F-4D97-AF65-F5344CB8AC3E}">
+        <p14:creationId xmlns:p14="http://schemas.microsoft.com/office/powerpoint/2010/main" val="3013494589"/>
+      </p:ext>
+    </p:extLst>
+  </p:cSld>
+  <p:clrMapOvr>
+    <a:masterClrMapping/>
+  </p:clrMapOvr>
+</p:sld>
+</file>
+
+<file path=ppt/slides/slide7.xml><?xml version="1.0" encoding="utf-8"?>
+<p:sld xmlns:a="http://schemas.openxmlformats.org/drawingml/2006/main" xmlns:r="http://schemas.openxmlformats.org/officeDocument/2006/relationships" xmlns:p="http://schemas.openxmlformats.org/presentationml/2006/main">
+  <p:cSld>
+    <p:spTree>
+      <p:nvGrpSpPr>
+        <p:cNvPr id="1" name=""/>
+        <p:cNvGrpSpPr/>
+        <p:nvPr/>
+      </p:nvGrpSpPr>
+      <p:grpSpPr>
+        <a:xfrm>
+          <a:off x="0" y="0"/>
+          <a:ext cx="0" cy="0"/>
+          <a:chOff x="0" y="0"/>
+          <a:chExt cx="0" cy="0"/>
+        </a:xfrm>
+      </p:grpSpPr>
+      <p:sp>
+        <p:nvSpPr>
+          <p:cNvPr id="2" name="Title 1">
+            <a:extLst>
+              <a:ext uri="{FF2B5EF4-FFF2-40B4-BE49-F238E27FC236}">
+                <a16:creationId xmlns:a16="http://schemas.microsoft.com/office/drawing/2014/main" id="{C88BBCE8-14AD-43BC-90E4-79FDE23DDB1C}"/>
+              </a:ext>
+            </a:extLst>
+          </p:cNvPr>
+          <p:cNvSpPr>
+            <a:spLocks noGrp="1"/>
+          </p:cNvSpPr>
+          <p:nvPr>
+            <p:ph type="title"/>
+          </p:nvPr>
+        </p:nvSpPr>
+        <p:spPr/>
+        <p:txBody>
+          <a:bodyPr/>
+          <a:lstStyle/>
+          <a:p>
+            <a:r>
+              <a:rPr lang="en-US" dirty="0">
+                <a:cs typeface="Calibri Light"/>
+              </a:rPr>
+              <a:t>Traditional vs. Managed APIs</a:t>
+            </a:r>
+            <a:endParaRPr lang="en-US"/>
+          </a:p>
+        </p:txBody>
+      </p:sp>
+      <p:pic>
+        <p:nvPicPr>
+          <p:cNvPr id="3" name="Picture 3" descr="A screenshot of a cell phone&#10;&#10;Description generated with very high confidence">
+            <a:extLst>
+              <a:ext uri="{FF2B5EF4-FFF2-40B4-BE49-F238E27FC236}">
+                <a16:creationId xmlns:a16="http://schemas.microsoft.com/office/drawing/2014/main" id="{319B1B18-3758-4A88-B868-3168B65C5646}"/>
+              </a:ext>
+            </a:extLst>
+          </p:cNvPr>
+          <p:cNvPicPr>
+            <a:picLocks noChangeAspect="1"/>
+          </p:cNvPicPr>
+          <p:nvPr/>
+        </p:nvPicPr>
+        <p:blipFill>
+          <a:blip r:embed="rId2"/>
+          <a:stretch>
+            <a:fillRect/>
+          </a:stretch>
+        </p:blipFill>
+        <p:spPr>
+          <a:xfrm>
+            <a:off x="2356758" y="1296734"/>
+            <a:ext cx="7623627" cy="5053746"/>
+          </a:xfrm>
+          <a:prstGeom prst="rect">
+            <a:avLst/>
+          </a:prstGeom>
+        </p:spPr>
+      </p:pic>
+      <p:sp>
+        <p:nvSpPr>
+          <p:cNvPr id="5" name="TextBox 4">
+            <a:extLst>
+              <a:ext uri="{FF2B5EF4-FFF2-40B4-BE49-F238E27FC236}">
+                <a16:creationId xmlns:a16="http://schemas.microsoft.com/office/drawing/2014/main" id="{C655C279-8914-4DEC-B333-394607FA394D}"/>
+              </a:ext>
+            </a:extLst>
+          </p:cNvPr>
+          <p:cNvSpPr txBox="1"/>
+          <p:nvPr/>
+        </p:nvSpPr>
+        <p:spPr>
+          <a:xfrm>
+            <a:off x="43543" y="6438899"/>
+            <a:ext cx="3985984" cy="369332"/>
+          </a:xfrm>
+          <a:prstGeom prst="rect">
+            <a:avLst/>
+          </a:prstGeom>
+          <a:noFill/>
+        </p:spPr>
+        <p:txBody>
+          <a:bodyPr rot="0" spcFirstLastPara="0" vertOverflow="overflow" horzOverflow="overflow" vert="horz" wrap="square" lIns="91440" tIns="45720" rIns="91440" bIns="45720" numCol="1" spcCol="0" rtlCol="0" fromWordArt="0" anchor="t" anchorCtr="0" forceAA="0" compatLnSpc="1">
+            <a:prstTxWarp prst="textNoShape">
+              <a:avLst/>
+            </a:prstTxWarp>
+            <a:spAutoFit/>
+          </a:bodyPr>
+          <a:lstStyle/>
+          <a:p>
+            <a:r>
+              <a:rPr lang="en-US"/>
+              <a:t>Quelle</a:t>
+            </a:r>
+            <a:r>
+              <a:rPr lang="en-US" dirty="0"/>
+              <a:t>: </a:t>
+            </a:r>
+            <a:r>
+              <a:rPr lang="en-US" dirty="0">
+                <a:ea typeface="+mn-lt"/>
+                <a:cs typeface="+mn-lt"/>
+                <a:hlinkClick r:id="rId3"/>
+              </a:rPr>
+              <a:t>https://github.com/kong/kong</a:t>
+            </a:r>
+            <a:endParaRPr lang="en-US"/>
+          </a:p>
+        </p:txBody>
+      </p:sp>
+    </p:spTree>
+    <p:extLst>
+      <p:ext uri="{BB962C8B-B14F-4D97-AF65-F5344CB8AC3E}">
+        <p14:creationId xmlns:p14="http://schemas.microsoft.com/office/powerpoint/2010/main" val="594093502"/>
+      </p:ext>
+    </p:extLst>
+  </p:cSld>
+  <p:clrMapOvr>
+    <a:masterClrMapping/>
+  </p:clrMapOvr>
+</p:sld>
+</file>
+
+<file path=ppt/slides/slide8.xml><?xml version="1.0" encoding="utf-8"?>
+<p:sld xmlns:a="http://schemas.openxmlformats.org/drawingml/2006/main" xmlns:r="http://schemas.openxmlformats.org/officeDocument/2006/relationships" xmlns:p="http://schemas.openxmlformats.org/presentationml/2006/main">
+  <p:cSld>
+    <p:spTree>
+      <p:nvGrpSpPr>
+        <p:cNvPr id="1" name=""/>
+        <p:cNvGrpSpPr/>
+        <p:nvPr/>
+      </p:nvGrpSpPr>
+      <p:grpSpPr>
+        <a:xfrm>
+          <a:off x="0" y="0"/>
+          <a:ext cx="0" cy="0"/>
+          <a:chOff x="0" y="0"/>
+          <a:chExt cx="0" cy="0"/>
+        </a:xfrm>
+      </p:grpSpPr>
+      <p:sp>
+        <p:nvSpPr>
+          <p:cNvPr id="2" name="Title 1">
+            <a:extLst>
+              <a:ext uri="{FF2B5EF4-FFF2-40B4-BE49-F238E27FC236}">
+                <a16:creationId xmlns:a16="http://schemas.microsoft.com/office/drawing/2014/main" id="{7C912831-7D34-40E6-B263-4279128B1ED2}"/>
+              </a:ext>
+            </a:extLst>
+          </p:cNvPr>
+          <p:cNvSpPr>
+            <a:spLocks noGrp="1"/>
+          </p:cNvSpPr>
+          <p:nvPr>
+            <p:ph type="title"/>
+          </p:nvPr>
+        </p:nvSpPr>
+        <p:spPr/>
+        <p:txBody>
+          <a:bodyPr/>
+          <a:lstStyle/>
+          <a:p>
+            <a:r>
               <a:rPr lang="de-AT" dirty="0"/>
               <a:t>Warum </a:t>
             </a:r>
@@ -4947,18 +6760,6 @@
           <a:p>
             <a:r>
               <a:rPr lang="de-AT" dirty="0"/>
-              <a:t>Legacy modernisieren</a:t>
-            </a:r>
-          </a:p>
-          <a:p>
-            <a:r>
-              <a:rPr lang="de-AT" dirty="0"/>
-              <a:t>Sicherheit erweitern</a:t>
-            </a:r>
-          </a:p>
-          <a:p>
-            <a:r>
-              <a:rPr lang="de-AT" dirty="0"/>
               <a:t>Third </a:t>
             </a:r>
             <a:r>
@@ -4972,9 +6773,28 @@
           </a:p>
           <a:p>
             <a:r>
+              <a:rPr lang="de-AT"/>
+              <a:t>Legacy modernisieren</a:t>
+            </a:r>
+          </a:p>
+          <a:p>
+            <a:r>
               <a:rPr lang="de-AT" dirty="0"/>
               <a:t>Zerlegung von Monolithen</a:t>
             </a:r>
+          </a:p>
+          <a:p>
+            <a:r>
+              <a:rPr lang="de-AT"/>
+              <a:t>Sicherheit gewährleisten</a:t>
+            </a:r>
+          </a:p>
+          <a:p>
+            <a:r>
+              <a:rPr lang="de-AT"/>
+              <a:t>Eingrenzen und Erweitern</a:t>
+            </a:r>
+            <a:endParaRPr lang="de-AT" dirty="0"/>
           </a:p>
           <a:p>
             <a:endParaRPr lang="de-AT" dirty="0"/>
@@ -4985,6 +6805,228 @@
     <p:extLst>
       <p:ext uri="{BB962C8B-B14F-4D97-AF65-F5344CB8AC3E}">
         <p14:creationId xmlns:p14="http://schemas.microsoft.com/office/powerpoint/2010/main" val="2436657735"/>
+      </p:ext>
+    </p:extLst>
+  </p:cSld>
+  <p:clrMapOvr>
+    <a:masterClrMapping/>
+  </p:clrMapOvr>
+</p:sld>
+</file>
+
+<file path=ppt/slides/slide9.xml><?xml version="1.0" encoding="utf-8"?>
+<p:sld xmlns:a="http://schemas.openxmlformats.org/drawingml/2006/main" xmlns:r="http://schemas.openxmlformats.org/officeDocument/2006/relationships" xmlns:p="http://schemas.openxmlformats.org/presentationml/2006/main">
+  <p:cSld>
+    <p:spTree>
+      <p:nvGrpSpPr>
+        <p:cNvPr id="1" name=""/>
+        <p:cNvGrpSpPr/>
+        <p:nvPr/>
+      </p:nvGrpSpPr>
+      <p:grpSpPr>
+        <a:xfrm>
+          <a:off x="0" y="0"/>
+          <a:ext cx="0" cy="0"/>
+          <a:chOff x="0" y="0"/>
+          <a:chExt cx="0" cy="0"/>
+        </a:xfrm>
+      </p:grpSpPr>
+      <p:sp>
+        <p:nvSpPr>
+          <p:cNvPr id="2" name="Title 1">
+            <a:extLst>
+              <a:ext uri="{FF2B5EF4-FFF2-40B4-BE49-F238E27FC236}">
+                <a16:creationId xmlns:a16="http://schemas.microsoft.com/office/drawing/2014/main" id="{63621081-9FEC-463D-84E6-F7C0B532B576}"/>
+              </a:ext>
+            </a:extLst>
+          </p:cNvPr>
+          <p:cNvSpPr>
+            <a:spLocks noGrp="1"/>
+          </p:cNvSpPr>
+          <p:nvPr>
+            <p:ph type="title"/>
+          </p:nvPr>
+        </p:nvSpPr>
+        <p:spPr/>
+        <p:txBody>
+          <a:bodyPr/>
+          <a:lstStyle/>
+          <a:p>
+            <a:r>
+              <a:rPr lang="en-US">
+                <a:cs typeface="Calibri Light"/>
+              </a:rPr>
+              <a:t>Example Kong</a:t>
+            </a:r>
+            <a:endParaRPr lang="en-US"/>
+          </a:p>
+        </p:txBody>
+      </p:sp>
+      <p:sp>
+        <p:nvSpPr>
+          <p:cNvPr id="3" name="Content Placeholder 2">
+            <a:extLst>
+              <a:ext uri="{FF2B5EF4-FFF2-40B4-BE49-F238E27FC236}">
+                <a16:creationId xmlns:a16="http://schemas.microsoft.com/office/drawing/2014/main" id="{95F297DF-ACDB-4040-840E-7F21692C6052}"/>
+              </a:ext>
+            </a:extLst>
+          </p:cNvPr>
+          <p:cNvSpPr>
+            <a:spLocks noGrp="1"/>
+          </p:cNvSpPr>
+          <p:nvPr>
+            <p:ph idx="1"/>
+          </p:nvPr>
+        </p:nvSpPr>
+        <p:spPr/>
+        <p:txBody>
+          <a:bodyPr vert="horz" lIns="91440" tIns="45720" rIns="91440" bIns="45720" rtlCol="0" anchor="t">
+            <a:normAutofit/>
+          </a:bodyPr>
+          <a:lstStyle/>
+          <a:p>
+            <a:r>
+              <a:rPr lang="en-US">
+                <a:cs typeface="Calibri"/>
+              </a:rPr>
+              <a:t>open source API gateway</a:t>
+            </a:r>
+            <a:endParaRPr lang="en-US" dirty="0">
+              <a:cs typeface="Calibri"/>
+            </a:endParaRPr>
+          </a:p>
+          <a:p>
+            <a:pPr lvl="1"/>
+            <a:r>
+              <a:rPr lang="en-US">
+                <a:cs typeface="Calibri"/>
+              </a:rPr>
+              <a:t>In fact it's fremium</a:t>
+            </a:r>
+          </a:p>
+          <a:p>
+            <a:r>
+              <a:rPr lang="en-US">
+                <a:cs typeface="Calibri"/>
+              </a:rPr>
+              <a:t>smaller feature set</a:t>
+            </a:r>
+          </a:p>
+          <a:p>
+            <a:r>
+              <a:rPr lang="en-US">
+                <a:cs typeface="Calibri"/>
+              </a:rPr>
+              <a:t>essentials are there</a:t>
+            </a:r>
+          </a:p>
+          <a:p>
+            <a:pPr lvl="1"/>
+            <a:r>
+              <a:rPr lang="en-US">
+                <a:cs typeface="Calibri"/>
+              </a:rPr>
+              <a:t>traffic control</a:t>
+            </a:r>
+          </a:p>
+          <a:p>
+            <a:pPr lvl="1"/>
+            <a:r>
+              <a:rPr lang="en-US">
+                <a:cs typeface="Calibri"/>
+              </a:rPr>
+              <a:t>security</a:t>
+            </a:r>
+            <a:endParaRPr lang="en-US" dirty="0">
+              <a:cs typeface="Calibri"/>
+            </a:endParaRPr>
+          </a:p>
+          <a:p>
+            <a:pPr lvl="1"/>
+            <a:r>
+              <a:rPr lang="en-US">
+                <a:cs typeface="Calibri"/>
+              </a:rPr>
+              <a:t>logging</a:t>
+            </a:r>
+            <a:endParaRPr lang="en-US" dirty="0">
+              <a:cs typeface="Calibri"/>
+            </a:endParaRPr>
+          </a:p>
+          <a:p>
+            <a:pPr lvl="1"/>
+            <a:r>
+              <a:rPr lang="en-US">
+                <a:cs typeface="Calibri"/>
+              </a:rPr>
+              <a:t>monitoring</a:t>
+            </a:r>
+          </a:p>
+          <a:p>
+            <a:pPr lvl="1"/>
+            <a:r>
+              <a:rPr lang="en-US">
+                <a:cs typeface="Calibri"/>
+              </a:rPr>
+              <a:t>...</a:t>
+            </a:r>
+            <a:endParaRPr lang="en-US" dirty="0">
+              <a:cs typeface="Calibri"/>
+            </a:endParaRPr>
+          </a:p>
+        </p:txBody>
+      </p:sp>
+      <p:sp>
+        <p:nvSpPr>
+          <p:cNvPr id="5" name="TextBox 4">
+            <a:extLst>
+              <a:ext uri="{FF2B5EF4-FFF2-40B4-BE49-F238E27FC236}">
+                <a16:creationId xmlns:a16="http://schemas.microsoft.com/office/drawing/2014/main" id="{7F441B90-A56A-4A0E-B7BF-4283E3AF3FA0}"/>
+              </a:ext>
+            </a:extLst>
+          </p:cNvPr>
+          <p:cNvSpPr txBox="1"/>
+          <p:nvPr/>
+        </p:nvSpPr>
+        <p:spPr>
+          <a:xfrm>
+            <a:off x="43543" y="6438899"/>
+            <a:ext cx="6934198" cy="369332"/>
+          </a:xfrm>
+          <a:prstGeom prst="rect">
+            <a:avLst/>
+          </a:prstGeom>
+          <a:noFill/>
+        </p:spPr>
+        <p:txBody>
+          <a:bodyPr rot="0" spcFirstLastPara="0" vertOverflow="overflow" horzOverflow="overflow" vert="horz" wrap="square" lIns="91440" tIns="45720" rIns="91440" bIns="45720" numCol="1" spcCol="0" rtlCol="0" fromWordArt="0" anchor="t" anchorCtr="0" forceAA="0" compatLnSpc="1">
+            <a:prstTxWarp prst="textNoShape">
+              <a:avLst/>
+            </a:prstTxWarp>
+            <a:spAutoFit/>
+          </a:bodyPr>
+          <a:lstStyle/>
+          <a:p>
+            <a:r>
+              <a:rPr lang="en-US"/>
+              <a:t>Quelle: </a:t>
+            </a:r>
+            <a:r>
+              <a:rPr lang="en-US" dirty="0">
+                <a:ea typeface="+mn-lt"/>
+                <a:cs typeface="+mn-lt"/>
+                <a:hlinkClick r:id="rId2"/>
+              </a:rPr>
+              <a:t>https://www.thoughtworks.com/radar/tools/kong-api-gateway</a:t>
+            </a:r>
+            <a:endParaRPr lang="en-US"/>
+          </a:p>
+        </p:txBody>
+      </p:sp>
+    </p:spTree>
+    <p:extLst>
+      <p:ext uri="{BB962C8B-B14F-4D97-AF65-F5344CB8AC3E}">
+        <p14:creationId xmlns:p14="http://schemas.microsoft.com/office/powerpoint/2010/main" val="1359770889"/>
       </p:ext>
     </p:extLst>
   </p:cSld>

</xml_diff>